<commit_message>
Update slides for SignalR Intro.
</commit_message>
<xml_diff>
--- a/SignalR-Intro/SignalRIntro.pptx
+++ b/SignalR-Intro/SignalRIntro.pptx
@@ -19,12 +19,12 @@
     <p:sldId id="279" r:id="rId10"/>
     <p:sldId id="292" r:id="rId11"/>
     <p:sldId id="291" r:id="rId12"/>
-    <p:sldId id="290" r:id="rId13"/>
-    <p:sldId id="281" r:id="rId14"/>
-    <p:sldId id="273" r:id="rId15"/>
+    <p:sldId id="304" r:id="rId13"/>
+    <p:sldId id="290" r:id="rId14"/>
+    <p:sldId id="305" r:id="rId15"/>
     <p:sldId id="278" r:id="rId16"/>
-    <p:sldId id="294" r:id="rId17"/>
-    <p:sldId id="277" r:id="rId18"/>
+    <p:sldId id="273" r:id="rId17"/>
+    <p:sldId id="307" r:id="rId18"/>
     <p:sldId id="298" r:id="rId19"/>
     <p:sldId id="285" r:id="rId20"/>
     <p:sldId id="293" r:id="rId21"/>
@@ -613,7 +613,165 @@
           <a:bodyPr/>
           <a:lstStyle/>
           <a:p>
-            <a:endParaRPr lang="en-US" dirty="0"/>
+            <a:pPr marL="0" marR="0" indent="0" algn="l" defTabSz="914400" rtl="0" eaLnBrk="1" fontAlgn="auto" latinLnBrk="0" hangingPunct="1">
+              <a:lnSpc>
+                <a:spcPct val="100000"/>
+              </a:lnSpc>
+              <a:spcBef>
+                <a:spcPts val="0"/>
+              </a:spcBef>
+              <a:spcAft>
+                <a:spcPts val="0"/>
+              </a:spcAft>
+              <a:buClrTx/>
+              <a:buSzTx/>
+              <a:buFontTx/>
+              <a:buNone/>
+              <a:tabLst/>
+              <a:defRPr/>
+            </a:pPr>
+            <a:r>
+              <a:rPr lang="en-US" dirty="0" smtClean="0"/>
+              <a:t>GET request</a:t>
+            </a:r>
+          </a:p>
+          <a:p>
+            <a:pPr marL="0" marR="0" indent="0" algn="l" defTabSz="914400" rtl="0" eaLnBrk="1" fontAlgn="auto" latinLnBrk="0" hangingPunct="1">
+              <a:lnSpc>
+                <a:spcPct val="100000"/>
+              </a:lnSpc>
+              <a:spcBef>
+                <a:spcPts val="0"/>
+              </a:spcBef>
+              <a:spcAft>
+                <a:spcPts val="0"/>
+              </a:spcAft>
+              <a:buClrTx/>
+              <a:buSzTx/>
+              <a:buFontTx/>
+              <a:buNone/>
+              <a:tabLst/>
+              <a:defRPr/>
+            </a:pPr>
+            <a:r>
+              <a:rPr lang="en-US" dirty="0" smtClean="0"/>
+              <a:t/>
+            </a:r>
+            <a:br>
+              <a:rPr lang="en-US" dirty="0" smtClean="0"/>
+            </a:br>
+            <a:r>
+              <a:rPr lang="en-US" dirty="0" smtClean="0"/>
+              <a:t>Raw connection, like a TCP socket.</a:t>
+            </a:r>
+            <a:r>
+              <a:rPr lang="en-US" baseline="0" dirty="0" smtClean="0"/>
+              <a:t> Very little overhead.</a:t>
+            </a:r>
+            <a:endParaRPr lang="en-US" dirty="0" smtClean="0"/>
+          </a:p>
+          <a:p>
+            <a:pPr marL="0" marR="0" indent="0" algn="l" defTabSz="914400" rtl="0" eaLnBrk="1" fontAlgn="auto" latinLnBrk="0" hangingPunct="1">
+              <a:lnSpc>
+                <a:spcPct val="100000"/>
+              </a:lnSpc>
+              <a:spcBef>
+                <a:spcPts val="0"/>
+              </a:spcBef>
+              <a:spcAft>
+                <a:spcPts val="0"/>
+              </a:spcAft>
+              <a:buClrTx/>
+              <a:buSzTx/>
+              <a:buFontTx/>
+              <a:buNone/>
+              <a:tabLst/>
+              <a:defRPr/>
+            </a:pPr>
+            <a:endParaRPr lang="en-US" dirty="0" smtClean="0"/>
+          </a:p>
+          <a:p>
+            <a:pPr marL="0" marR="0" indent="0" algn="l" defTabSz="914400" rtl="0" eaLnBrk="1" fontAlgn="auto" latinLnBrk="0" hangingPunct="1">
+              <a:lnSpc>
+                <a:spcPct val="100000"/>
+              </a:lnSpc>
+              <a:spcBef>
+                <a:spcPts val="0"/>
+              </a:spcBef>
+              <a:spcAft>
+                <a:spcPts val="0"/>
+              </a:spcAft>
+              <a:buClrTx/>
+              <a:buSzTx/>
+              <a:buFontTx/>
+              <a:buNone/>
+              <a:tabLst/>
+              <a:defRPr/>
+            </a:pPr>
+            <a:r>
+              <a:rPr lang="en-US" dirty="0" smtClean="0"/>
+              <a:t>Everything</a:t>
+            </a:r>
+            <a:r>
+              <a:rPr lang="en-US" baseline="0" dirty="0" smtClean="0"/>
+              <a:t> </a:t>
+            </a:r>
+            <a:r>
+              <a:rPr lang="en-US" baseline="0" dirty="0" smtClean="0"/>
+              <a:t>between your browser and the server, which can be endless, firewalls, routers, etc. has to understand </a:t>
+            </a:r>
+            <a:r>
+              <a:rPr lang="en-US" baseline="0" dirty="0" err="1" smtClean="0"/>
+              <a:t>websocket</a:t>
+            </a:r>
+            <a:r>
+              <a:rPr lang="en-US" baseline="0" dirty="0" smtClean="0"/>
+              <a:t> protocol.  That</a:t>
+            </a:r>
+          </a:p>
+          <a:p>
+            <a:pPr marL="0" marR="0" indent="0" algn="l" defTabSz="914400" rtl="0" eaLnBrk="1" fontAlgn="auto" latinLnBrk="0" hangingPunct="1">
+              <a:lnSpc>
+                <a:spcPct val="100000"/>
+              </a:lnSpc>
+              <a:spcBef>
+                <a:spcPts val="0"/>
+              </a:spcBef>
+              <a:spcAft>
+                <a:spcPts val="0"/>
+              </a:spcAft>
+              <a:buClrTx/>
+              <a:buSzTx/>
+              <a:buFontTx/>
+              <a:buNone/>
+              <a:tabLst/>
+              <a:defRPr/>
+            </a:pPr>
+            <a:r>
+              <a:rPr lang="en-US" baseline="0" dirty="0" smtClean="0"/>
+              <a:t>Will take a while…big implications, security etc.</a:t>
+            </a:r>
+            <a:endParaRPr lang="en-US" dirty="0" smtClean="0"/>
+          </a:p>
+          <a:p>
+            <a:pPr marL="0" marR="0" indent="0" algn="l" defTabSz="914400" rtl="0" eaLnBrk="1" fontAlgn="auto" latinLnBrk="0" hangingPunct="1">
+              <a:lnSpc>
+                <a:spcPct val="100000"/>
+              </a:lnSpc>
+              <a:spcBef>
+                <a:spcPts val="0"/>
+              </a:spcBef>
+              <a:spcAft>
+                <a:spcPts val="0"/>
+              </a:spcAft>
+              <a:buClrTx/>
+              <a:buSzTx/>
+              <a:buFontTx/>
+              <a:buNone/>
+              <a:tabLst/>
+              <a:defRPr/>
+            </a:pPr>
+            <a:endParaRPr lang="en-US" dirty="0" smtClean="0"/>
           </a:p>
         </p:txBody>
       </p:sp>
@@ -634,7 +792,7 @@
           <a:p>
             <a:fld id="{E76AAE11-CCE4-491F-9A3B-35EA6902E85C}" type="slidenum">
               <a:rPr lang="en-US" smtClean="0"/>
-              <a:t>16</a:t>
+              <a:t>15</a:t>
             </a:fld>
             <a:endParaRPr lang="en-US"/>
           </a:p>
@@ -697,7 +855,165 @@
           <a:bodyPr/>
           <a:lstStyle/>
           <a:p>
-            <a:endParaRPr lang="en-US" dirty="0"/>
+            <a:pPr marL="0" marR="0" indent="0" algn="l" defTabSz="914400" rtl="0" eaLnBrk="1" fontAlgn="auto" latinLnBrk="0" hangingPunct="1">
+              <a:lnSpc>
+                <a:spcPct val="100000"/>
+              </a:lnSpc>
+              <a:spcBef>
+                <a:spcPts val="0"/>
+              </a:spcBef>
+              <a:spcAft>
+                <a:spcPts val="0"/>
+              </a:spcAft>
+              <a:buClrTx/>
+              <a:buSzTx/>
+              <a:buFontTx/>
+              <a:buNone/>
+              <a:tabLst/>
+              <a:defRPr/>
+            </a:pPr>
+            <a:r>
+              <a:rPr lang="en-US" dirty="0" smtClean="0"/>
+              <a:t>GET request</a:t>
+            </a:r>
+          </a:p>
+          <a:p>
+            <a:pPr marL="0" marR="0" indent="0" algn="l" defTabSz="914400" rtl="0" eaLnBrk="1" fontAlgn="auto" latinLnBrk="0" hangingPunct="1">
+              <a:lnSpc>
+                <a:spcPct val="100000"/>
+              </a:lnSpc>
+              <a:spcBef>
+                <a:spcPts val="0"/>
+              </a:spcBef>
+              <a:spcAft>
+                <a:spcPts val="0"/>
+              </a:spcAft>
+              <a:buClrTx/>
+              <a:buSzTx/>
+              <a:buFontTx/>
+              <a:buNone/>
+              <a:tabLst/>
+              <a:defRPr/>
+            </a:pPr>
+            <a:r>
+              <a:rPr lang="en-US" dirty="0" smtClean="0"/>
+              <a:t/>
+            </a:r>
+            <a:br>
+              <a:rPr lang="en-US" dirty="0" smtClean="0"/>
+            </a:br>
+            <a:r>
+              <a:rPr lang="en-US" dirty="0" smtClean="0"/>
+              <a:t>Raw connection, like a TCP socket.</a:t>
+            </a:r>
+            <a:r>
+              <a:rPr lang="en-US" baseline="0" dirty="0" smtClean="0"/>
+              <a:t> Very little overhead.</a:t>
+            </a:r>
+            <a:endParaRPr lang="en-US" dirty="0" smtClean="0"/>
+          </a:p>
+          <a:p>
+            <a:pPr marL="0" marR="0" indent="0" algn="l" defTabSz="914400" rtl="0" eaLnBrk="1" fontAlgn="auto" latinLnBrk="0" hangingPunct="1">
+              <a:lnSpc>
+                <a:spcPct val="100000"/>
+              </a:lnSpc>
+              <a:spcBef>
+                <a:spcPts val="0"/>
+              </a:spcBef>
+              <a:spcAft>
+                <a:spcPts val="0"/>
+              </a:spcAft>
+              <a:buClrTx/>
+              <a:buSzTx/>
+              <a:buFontTx/>
+              <a:buNone/>
+              <a:tabLst/>
+              <a:defRPr/>
+            </a:pPr>
+            <a:endParaRPr lang="en-US" dirty="0" smtClean="0"/>
+          </a:p>
+          <a:p>
+            <a:pPr marL="0" marR="0" indent="0" algn="l" defTabSz="914400" rtl="0" eaLnBrk="1" fontAlgn="auto" latinLnBrk="0" hangingPunct="1">
+              <a:lnSpc>
+                <a:spcPct val="100000"/>
+              </a:lnSpc>
+              <a:spcBef>
+                <a:spcPts val="0"/>
+              </a:spcBef>
+              <a:spcAft>
+                <a:spcPts val="0"/>
+              </a:spcAft>
+              <a:buClrTx/>
+              <a:buSzTx/>
+              <a:buFontTx/>
+              <a:buNone/>
+              <a:tabLst/>
+              <a:defRPr/>
+            </a:pPr>
+            <a:r>
+              <a:rPr lang="en-US" dirty="0" smtClean="0"/>
+              <a:t>Everything</a:t>
+            </a:r>
+            <a:r>
+              <a:rPr lang="en-US" baseline="0" dirty="0" smtClean="0"/>
+              <a:t> </a:t>
+            </a:r>
+            <a:r>
+              <a:rPr lang="en-US" baseline="0" dirty="0" smtClean="0"/>
+              <a:t>between your browser and the server, which can be endless, firewalls, routers, etc. has to understand </a:t>
+            </a:r>
+            <a:r>
+              <a:rPr lang="en-US" baseline="0" dirty="0" err="1" smtClean="0"/>
+              <a:t>websocket</a:t>
+            </a:r>
+            <a:r>
+              <a:rPr lang="en-US" baseline="0" dirty="0" smtClean="0"/>
+              <a:t> protocol.  That</a:t>
+            </a:r>
+          </a:p>
+          <a:p>
+            <a:pPr marL="0" marR="0" indent="0" algn="l" defTabSz="914400" rtl="0" eaLnBrk="1" fontAlgn="auto" latinLnBrk="0" hangingPunct="1">
+              <a:lnSpc>
+                <a:spcPct val="100000"/>
+              </a:lnSpc>
+              <a:spcBef>
+                <a:spcPts val="0"/>
+              </a:spcBef>
+              <a:spcAft>
+                <a:spcPts val="0"/>
+              </a:spcAft>
+              <a:buClrTx/>
+              <a:buSzTx/>
+              <a:buFontTx/>
+              <a:buNone/>
+              <a:tabLst/>
+              <a:defRPr/>
+            </a:pPr>
+            <a:r>
+              <a:rPr lang="en-US" baseline="0" dirty="0" smtClean="0"/>
+              <a:t>Will take a while…big implications, security etc.</a:t>
+            </a:r>
+            <a:endParaRPr lang="en-US" dirty="0" smtClean="0"/>
+          </a:p>
+          <a:p>
+            <a:pPr marL="0" marR="0" indent="0" algn="l" defTabSz="914400" rtl="0" eaLnBrk="1" fontAlgn="auto" latinLnBrk="0" hangingPunct="1">
+              <a:lnSpc>
+                <a:spcPct val="100000"/>
+              </a:lnSpc>
+              <a:spcBef>
+                <a:spcPts val="0"/>
+              </a:spcBef>
+              <a:spcAft>
+                <a:spcPts val="0"/>
+              </a:spcAft>
+              <a:buClrTx/>
+              <a:buSzTx/>
+              <a:buFontTx/>
+              <a:buNone/>
+              <a:tabLst/>
+              <a:defRPr/>
+            </a:pPr>
+            <a:endParaRPr lang="en-US" dirty="0" smtClean="0"/>
           </a:p>
         </p:txBody>
       </p:sp>
@@ -718,7 +1034,7 @@
           <a:p>
             <a:fld id="{E76AAE11-CCE4-491F-9A3B-35EA6902E85C}" type="slidenum">
               <a:rPr lang="en-US" smtClean="0"/>
-              <a:t>20</a:t>
+              <a:t>17</a:t>
             </a:fld>
             <a:endParaRPr lang="en-US"/>
           </a:p>
@@ -802,7 +1118,7 @@
           <a:p>
             <a:fld id="{E76AAE11-CCE4-491F-9A3B-35EA6902E85C}" type="slidenum">
               <a:rPr lang="en-US" smtClean="0"/>
-              <a:t>22</a:t>
+              <a:t>20</a:t>
             </a:fld>
             <a:endParaRPr lang="en-US"/>
           </a:p>
@@ -811,7 +1127,7 @@
     </p:spTree>
     <p:extLst>
       <p:ext uri="{BB962C8B-B14F-4D97-AF65-F5344CB8AC3E}">
-        <p14:creationId xmlns:p14="http://schemas.microsoft.com/office/powerpoint/2010/main" val="3615951867"/>
+        <p14:creationId xmlns:p14="http://schemas.microsoft.com/office/powerpoint/2010/main" val="374496698"/>
       </p:ext>
     </p:extLst>
   </p:cSld>
@@ -886,6 +1202,90 @@
           <a:p>
             <a:fld id="{E76AAE11-CCE4-491F-9A3B-35EA6902E85C}" type="slidenum">
               <a:rPr lang="en-US" smtClean="0"/>
+              <a:t>22</a:t>
+            </a:fld>
+            <a:endParaRPr lang="en-US"/>
+          </a:p>
+        </p:txBody>
+      </p:sp>
+    </p:spTree>
+    <p:extLst>
+      <p:ext uri="{BB962C8B-B14F-4D97-AF65-F5344CB8AC3E}">
+        <p14:creationId xmlns:p14="http://schemas.microsoft.com/office/powerpoint/2010/main" val="3615951867"/>
+      </p:ext>
+    </p:extLst>
+  </p:cSld>
+  <p:clrMapOvr>
+    <a:masterClrMapping/>
+  </p:clrMapOvr>
+</p:notes>
+</file>
+
+<file path=ppt/notesSlides/notesSlide14.xml><?xml version="1.0" encoding="utf-8"?>
+<p:notes xmlns:a="http://schemas.openxmlformats.org/drawingml/2006/main" xmlns:r="http://schemas.openxmlformats.org/officeDocument/2006/relationships" xmlns:p="http://schemas.openxmlformats.org/presentationml/2006/main">
+  <p:cSld>
+    <p:spTree>
+      <p:nvGrpSpPr>
+        <p:cNvPr id="1" name=""/>
+        <p:cNvGrpSpPr/>
+        <p:nvPr/>
+      </p:nvGrpSpPr>
+      <p:grpSpPr>
+        <a:xfrm>
+          <a:off x="0" y="0"/>
+          <a:ext cx="0" cy="0"/>
+          <a:chOff x="0" y="0"/>
+          <a:chExt cx="0" cy="0"/>
+        </a:xfrm>
+      </p:grpSpPr>
+      <p:sp>
+        <p:nvSpPr>
+          <p:cNvPr id="2" name="Slide Image Placeholder 1"/>
+          <p:cNvSpPr>
+            <a:spLocks noGrp="1" noRot="1" noChangeAspect="1"/>
+          </p:cNvSpPr>
+          <p:nvPr>
+            <p:ph type="sldImg"/>
+          </p:nvPr>
+        </p:nvSpPr>
+        <p:spPr/>
+      </p:sp>
+      <p:sp>
+        <p:nvSpPr>
+          <p:cNvPr id="3" name="Notes Placeholder 2"/>
+          <p:cNvSpPr>
+            <a:spLocks noGrp="1"/>
+          </p:cNvSpPr>
+          <p:nvPr>
+            <p:ph type="body" idx="1"/>
+          </p:nvPr>
+        </p:nvSpPr>
+        <p:spPr/>
+        <p:txBody>
+          <a:bodyPr/>
+          <a:lstStyle/>
+          <a:p>
+            <a:endParaRPr lang="en-US" dirty="0"/>
+          </a:p>
+        </p:txBody>
+      </p:sp>
+      <p:sp>
+        <p:nvSpPr>
+          <p:cNvPr id="4" name="Slide Number Placeholder 3"/>
+          <p:cNvSpPr>
+            <a:spLocks noGrp="1"/>
+          </p:cNvSpPr>
+          <p:nvPr>
+            <p:ph type="sldNum" sz="quarter" idx="10"/>
+          </p:nvPr>
+        </p:nvSpPr>
+        <p:spPr/>
+        <p:txBody>
+          <a:bodyPr/>
+          <a:lstStyle/>
+          <a:p>
+            <a:fld id="{E76AAE11-CCE4-491F-9A3B-35EA6902E85C}" type="slidenum">
+              <a:rPr lang="en-US" smtClean="0"/>
               <a:t>24</a:t>
             </a:fld>
             <a:endParaRPr lang="en-US"/>
@@ -905,7 +1305,7 @@
 </p:notes>
 </file>
 
-<file path=ppt/notesSlides/notesSlide14.xml><?xml version="1.0" encoding="utf-8"?>
+<file path=ppt/notesSlides/notesSlide15.xml><?xml version="1.0" encoding="utf-8"?>
 <p:notes xmlns:a="http://schemas.openxmlformats.org/drawingml/2006/main" xmlns:r="http://schemas.openxmlformats.org/officeDocument/2006/relationships" xmlns:p="http://schemas.openxmlformats.org/presentationml/2006/main">
   <p:cSld>
     <p:spTree>
@@ -1349,15 +1749,7 @@
           <a:p>
             <a:r>
               <a:rPr lang="en-US" dirty="0" smtClean="0"/>
-              <a:t>Leave </a:t>
-            </a:r>
-            <a:r>
-              <a:rPr lang="en-US" dirty="0" smtClean="0"/>
-              <a:t>note about hybrid </a:t>
-            </a:r>
-            <a:r>
-              <a:rPr lang="en-US" dirty="0" smtClean="0"/>
-              <a:t>polling</a:t>
+              <a:t>Leave note about hybrid polling</a:t>
             </a:r>
           </a:p>
           <a:p>
@@ -1370,11 +1762,7 @@
             </a:r>
             <a:r>
               <a:rPr lang="en-US" baseline="0" dirty="0" smtClean="0"/>
-              <a:t> by most AJAX </a:t>
-            </a:r>
-            <a:r>
-              <a:rPr lang="en-US" baseline="0" dirty="0" smtClean="0"/>
-              <a:t>apps</a:t>
+              <a:t> by most AJAX apps</a:t>
             </a:r>
           </a:p>
           <a:p>
@@ -1475,7 +1863,7 @@
           <a:p>
             <a:r>
               <a:rPr lang="en-US" dirty="0" smtClean="0"/>
-              <a:t>HTTP Hack.</a:t>
+              <a:t>Notes for Long Polling.</a:t>
             </a:r>
             <a:endParaRPr lang="en-US" dirty="0"/>
           </a:p>
@@ -1498,7 +1886,7 @@
           <a:p>
             <a:fld id="{E76AAE11-CCE4-491F-9A3B-35EA6902E85C}" type="slidenum">
               <a:rPr lang="en-US" smtClean="0"/>
-              <a:t>10</a:t>
+              <a:t>9</a:t>
             </a:fld>
             <a:endParaRPr lang="en-US"/>
           </a:p>
@@ -1507,7 +1895,7 @@
     </p:spTree>
     <p:extLst>
       <p:ext uri="{BB962C8B-B14F-4D97-AF65-F5344CB8AC3E}">
-        <p14:creationId xmlns:p14="http://schemas.microsoft.com/office/powerpoint/2010/main" val="374496698"/>
+        <p14:creationId xmlns:p14="http://schemas.microsoft.com/office/powerpoint/2010/main" val="2924130273"/>
       </p:ext>
     </p:extLst>
   </p:cSld>
@@ -1563,7 +1951,7 @@
           <a:p>
             <a:r>
               <a:rPr lang="en-US" dirty="0" smtClean="0"/>
-              <a:t>Another HTTP Hack.</a:t>
+              <a:t>HTTP Hack.</a:t>
             </a:r>
             <a:endParaRPr lang="en-US" dirty="0"/>
           </a:p>
@@ -1586,7 +1974,7 @@
           <a:p>
             <a:fld id="{E76AAE11-CCE4-491F-9A3B-35EA6902E85C}" type="slidenum">
               <a:rPr lang="en-US" smtClean="0"/>
-              <a:t>11</a:t>
+              <a:t>10</a:t>
             </a:fld>
             <a:endParaRPr lang="en-US"/>
           </a:p>
@@ -1651,29 +2039,7 @@
           <a:p>
             <a:r>
               <a:rPr lang="en-US" dirty="0" smtClean="0"/>
-              <a:t>Request</a:t>
-            </a:r>
-            <a:r>
-              <a:rPr lang="en-US" baseline="0" dirty="0" smtClean="0"/>
-              <a:t> sent w/ header “Event source request’</a:t>
-            </a:r>
-          </a:p>
-          <a:p>
-            <a:r>
-              <a:rPr lang="en-US" baseline="0" dirty="0" smtClean="0"/>
-              <a:t>Server keeps request open and streams information over response stream</a:t>
-            </a:r>
-          </a:p>
-          <a:p>
-            <a:r>
-              <a:rPr lang="en-US" baseline="0" dirty="0" smtClean="0"/>
-              <a:t> -&gt; Single HTTP connection</a:t>
-            </a:r>
-          </a:p>
-          <a:p>
-            <a:r>
-              <a:rPr lang="en-US" baseline="0" dirty="0" smtClean="0"/>
-              <a:t> -&gt; faster latency, no period between response sent back, processing, and request again</a:t>
+              <a:t>Another HTTP Hack.</a:t>
             </a:r>
             <a:endParaRPr lang="en-US" dirty="0"/>
           </a:p>
@@ -1696,7 +2062,7 @@
           <a:p>
             <a:fld id="{E76AAE11-CCE4-491F-9A3B-35EA6902E85C}" type="slidenum">
               <a:rPr lang="en-US" smtClean="0"/>
-              <a:t>12</a:t>
+              <a:t>11</a:t>
             </a:fld>
             <a:endParaRPr lang="en-US"/>
           </a:p>
@@ -1759,111 +2125,32 @@
           <a:bodyPr/>
           <a:lstStyle/>
           <a:p>
-            <a:pPr marL="0" marR="0" indent="0" algn="l" defTabSz="914400" rtl="0" eaLnBrk="1" fontAlgn="auto" latinLnBrk="0" hangingPunct="1">
-              <a:lnSpc>
-                <a:spcPct val="100000"/>
-              </a:lnSpc>
-              <a:spcBef>
-                <a:spcPts val="0"/>
-              </a:spcBef>
-              <a:spcAft>
-                <a:spcPts val="0"/>
-              </a:spcAft>
-              <a:buClrTx/>
-              <a:buSzTx/>
-              <a:buFontTx/>
-              <a:buNone/>
-              <a:tabLst/>
-              <a:defRPr/>
-            </a:pPr>
             <a:r>
               <a:rPr lang="en-US" dirty="0" smtClean="0"/>
-              <a:t>Everything</a:t>
+              <a:t>Request</a:t>
             </a:r>
             <a:r>
               <a:rPr lang="en-US" baseline="0" dirty="0" smtClean="0"/>
-              <a:t> between your browser and the server, which can be endless, firewalls, routers, etc. has to understand </a:t>
-            </a:r>
-            <a:r>
-              <a:rPr lang="en-US" baseline="0" dirty="0" err="1" smtClean="0"/>
-              <a:t>websocket</a:t>
-            </a:r>
+              <a:t> sent w/ header “Event source request’</a:t>
+            </a:r>
+          </a:p>
+          <a:p>
             <a:r>
               <a:rPr lang="en-US" baseline="0" dirty="0" smtClean="0"/>
-              <a:t> protocol.  That</a:t>
-            </a:r>
-          </a:p>
-          <a:p>
-            <a:pPr marL="0" marR="0" indent="0" algn="l" defTabSz="914400" rtl="0" eaLnBrk="1" fontAlgn="auto" latinLnBrk="0" hangingPunct="1">
-              <a:lnSpc>
-                <a:spcPct val="100000"/>
-              </a:lnSpc>
-              <a:spcBef>
-                <a:spcPts val="0"/>
-              </a:spcBef>
-              <a:spcAft>
-                <a:spcPts val="0"/>
-              </a:spcAft>
-              <a:buClrTx/>
-              <a:buSzTx/>
-              <a:buFontTx/>
-              <a:buNone/>
-              <a:tabLst/>
-              <a:defRPr/>
-            </a:pPr>
+              <a:t>Server keeps request open and streams information over response stream</a:t>
+            </a:r>
+          </a:p>
+          <a:p>
             <a:r>
               <a:rPr lang="en-US" baseline="0" dirty="0" smtClean="0"/>
-              <a:t>Will take a while…big implications, security etc.</a:t>
-            </a:r>
-            <a:endParaRPr lang="en-US" dirty="0" smtClean="0"/>
-          </a:p>
-          <a:p>
-            <a:pPr marL="0" marR="0" indent="0" algn="l" defTabSz="914400" rtl="0" eaLnBrk="1" fontAlgn="auto" latinLnBrk="0" hangingPunct="1">
-              <a:lnSpc>
-                <a:spcPct val="100000"/>
-              </a:lnSpc>
-              <a:spcBef>
-                <a:spcPts val="0"/>
-              </a:spcBef>
-              <a:spcAft>
-                <a:spcPts val="0"/>
-              </a:spcAft>
-              <a:buClrTx/>
-              <a:buSzTx/>
-              <a:buFontTx/>
-              <a:buNone/>
-              <a:tabLst/>
-              <a:defRPr/>
-            </a:pPr>
-            <a:r>
-              <a:rPr lang="en-US" dirty="0" smtClean="0"/>
-              <a:t>GET request</a:t>
-            </a:r>
-          </a:p>
-          <a:p>
-            <a:pPr marL="0" marR="0" indent="0" algn="l" defTabSz="914400" rtl="0" eaLnBrk="1" fontAlgn="auto" latinLnBrk="0" hangingPunct="1">
-              <a:lnSpc>
-                <a:spcPct val="100000"/>
-              </a:lnSpc>
-              <a:spcBef>
-                <a:spcPts val="0"/>
-              </a:spcBef>
-              <a:spcAft>
-                <a:spcPts val="0"/>
-              </a:spcAft>
-              <a:buClrTx/>
-              <a:buSzTx/>
-              <a:buFontTx/>
-              <a:buNone/>
-              <a:tabLst/>
-              <a:defRPr/>
-            </a:pPr>
-            <a:r>
-              <a:rPr lang="en-US" dirty="0" smtClean="0"/>
-              <a:t>Raw connection, like a TCP socket</a:t>
-            </a:r>
-          </a:p>
-          <a:p>
+              <a:t> -&gt; Single HTTP connection</a:t>
+            </a:r>
+          </a:p>
+          <a:p>
+            <a:r>
+              <a:rPr lang="en-US" baseline="0" dirty="0" smtClean="0"/>
+              <a:t> -&gt; faster latency, no period between response sent back, processing, and request again</a:t>
+            </a:r>
             <a:endParaRPr lang="en-US" dirty="0"/>
           </a:p>
         </p:txBody>
@@ -1885,7 +2172,7 @@
           <a:p>
             <a:fld id="{E76AAE11-CCE4-491F-9A3B-35EA6902E85C}" type="slidenum">
               <a:rPr lang="en-US" smtClean="0"/>
-              <a:t>15</a:t>
+              <a:t>13</a:t>
             </a:fld>
             <a:endParaRPr lang="en-US"/>
           </a:p>
@@ -5382,182 +5669,6 @@
           </a:p>
         </p:txBody>
       </p:sp>
-      <p:sp>
-        <p:nvSpPr>
-          <p:cNvPr id="3" name="Subtitle 2"/>
-          <p:cNvSpPr>
-            <a:spLocks noGrp="1"/>
-          </p:cNvSpPr>
-          <p:nvPr>
-            <p:ph type="subTitle" idx="1"/>
-          </p:nvPr>
-        </p:nvSpPr>
-        <p:spPr>
-          <a:xfrm>
-            <a:off x="228600" y="1066800"/>
-            <a:ext cx="8763000" cy="5486400"/>
-          </a:xfrm>
-        </p:spPr>
-        <p:txBody>
-          <a:bodyPr>
-            <a:noAutofit/>
-          </a:bodyPr>
-          <a:lstStyle/>
-          <a:p>
-            <a:pPr marL="857250" indent="-857250" algn="l">
-              <a:buFont typeface="Arial" pitchFamily="34" charset="0"/>
-              <a:buChar char="•"/>
-            </a:pPr>
-            <a:r>
-              <a:rPr lang="en-US" sz="4800" dirty="0" smtClean="0">
-                <a:solidFill>
-                  <a:schemeClr val="tx1">
-                    <a:lumMod val="50000"/>
-                    <a:lumOff val="50000"/>
-                  </a:schemeClr>
-                </a:solidFill>
-                <a:latin typeface="Yanone Kaffeesatz Bold" pitchFamily="2" charset="0"/>
-              </a:rPr>
-              <a:t>Standard AJAX </a:t>
-            </a:r>
-          </a:p>
-          <a:p>
-            <a:pPr marL="1314450" lvl="1" indent="-857250" algn="l">
-              <a:buFont typeface="Arial" pitchFamily="34" charset="0"/>
-              <a:buChar char="•"/>
-            </a:pPr>
-            <a:r>
-              <a:rPr lang="en-US" sz="4400" dirty="0" smtClean="0">
-                <a:solidFill>
-                  <a:schemeClr val="tx1">
-                    <a:lumMod val="50000"/>
-                    <a:lumOff val="50000"/>
-                  </a:schemeClr>
-                </a:solidFill>
-                <a:latin typeface="Yanone Kaffeesatz Bold" pitchFamily="2" charset="0"/>
-              </a:rPr>
-              <a:t>support in all browsers</a:t>
-            </a:r>
-          </a:p>
-          <a:p>
-            <a:pPr marL="857250" indent="-857250" algn="l">
-              <a:buFont typeface="Arial" pitchFamily="34" charset="0"/>
-              <a:buChar char="•"/>
-            </a:pPr>
-            <a:r>
-              <a:rPr lang="en-US" sz="4800" dirty="0" smtClean="0">
-                <a:solidFill>
-                  <a:schemeClr val="tx1">
-                    <a:lumMod val="50000"/>
-                    <a:lumOff val="50000"/>
-                  </a:schemeClr>
-                </a:solidFill>
-                <a:latin typeface="Yanone Kaffeesatz Bold" pitchFamily="2" charset="0"/>
-              </a:rPr>
-              <a:t>Sends request to server, but no response is returned until available</a:t>
-            </a:r>
-          </a:p>
-          <a:p>
-            <a:pPr marL="857250" indent="-857250" algn="l">
-              <a:buFont typeface="Arial" pitchFamily="34" charset="0"/>
-              <a:buChar char="•"/>
-            </a:pPr>
-            <a:r>
-              <a:rPr lang="en-US" sz="4800" dirty="0" smtClean="0">
-                <a:solidFill>
-                  <a:schemeClr val="tx1">
-                    <a:lumMod val="50000"/>
-                    <a:lumOff val="50000"/>
-                  </a:schemeClr>
-                </a:solidFill>
-                <a:latin typeface="Yanone Kaffeesatz Bold" pitchFamily="2" charset="0"/>
-              </a:rPr>
-              <a:t>Connection is typically refreshed at fixed, longer duration intervals</a:t>
-            </a:r>
-          </a:p>
-          <a:p>
-            <a:pPr marL="857250" indent="-857250" algn="l">
-              <a:buFont typeface="Arial" pitchFamily="34" charset="0"/>
-              <a:buChar char="•"/>
-            </a:pPr>
-            <a:r>
-              <a:rPr lang="en-US" sz="4800" dirty="0">
-                <a:solidFill>
-                  <a:schemeClr val="tx1">
-                    <a:lumMod val="50000"/>
-                    <a:lumOff val="50000"/>
-                  </a:schemeClr>
-                </a:solidFill>
-                <a:latin typeface="Yanone Kaffeesatz Bold" pitchFamily="2" charset="0"/>
-              </a:rPr>
-              <a:t>Requires complex JS + </a:t>
-            </a:r>
-            <a:r>
-              <a:rPr lang="en-US" sz="4800" dirty="0" err="1">
-                <a:solidFill>
-                  <a:schemeClr val="tx1">
-                    <a:lumMod val="50000"/>
-                    <a:lumOff val="50000"/>
-                  </a:schemeClr>
-                </a:solidFill>
-                <a:latin typeface="Yanone Kaffeesatz Bold" pitchFamily="2" charset="0"/>
-              </a:rPr>
-              <a:t>XmlHttpRequest</a:t>
-            </a:r>
-            <a:endParaRPr lang="en-US" sz="4800" dirty="0" smtClean="0">
-              <a:solidFill>
-                <a:schemeClr val="tx1">
-                  <a:lumMod val="50000"/>
-                  <a:lumOff val="50000"/>
-                </a:schemeClr>
-              </a:solidFill>
-              <a:latin typeface="Yanone Kaffeesatz Bold" pitchFamily="2" charset="0"/>
-            </a:endParaRPr>
-          </a:p>
-          <a:p>
-            <a:pPr algn="l"/>
-            <a:endParaRPr lang="en-US" sz="3500" dirty="0" smtClean="0">
-              <a:solidFill>
-                <a:schemeClr val="tx1">
-                  <a:lumMod val="50000"/>
-                  <a:lumOff val="50000"/>
-                </a:schemeClr>
-              </a:solidFill>
-              <a:latin typeface="Yanone Kaffeesatz Bold" pitchFamily="2" charset="0"/>
-            </a:endParaRPr>
-          </a:p>
-          <a:p>
-            <a:pPr marL="857250" indent="-857250" algn="l">
-              <a:buFont typeface="Arial" pitchFamily="34" charset="0"/>
-              <a:buChar char="•"/>
-            </a:pPr>
-            <a:endParaRPr lang="en-US" sz="5000" dirty="0" smtClean="0">
-              <a:solidFill>
-                <a:schemeClr val="tx1">
-                  <a:lumMod val="50000"/>
-                  <a:lumOff val="50000"/>
-                </a:schemeClr>
-              </a:solidFill>
-              <a:latin typeface="Yanone Kaffeesatz Bold" pitchFamily="2" charset="0"/>
-            </a:endParaRPr>
-          </a:p>
-          <a:p>
-            <a:pPr marL="857250" indent="-857250" algn="l">
-              <a:buFont typeface="Arial" pitchFamily="34" charset="0"/>
-              <a:buChar char="•"/>
-            </a:pPr>
-            <a:endParaRPr lang="en-US" sz="5000" dirty="0">
-              <a:solidFill>
-                <a:schemeClr val="tx1">
-                  <a:lumMod val="50000"/>
-                  <a:lumOff val="50000"/>
-                </a:schemeClr>
-              </a:solidFill>
-              <a:latin typeface="Yanone Kaffeesatz Bold" pitchFamily="2" charset="0"/>
-            </a:endParaRPr>
-          </a:p>
-        </p:txBody>
-      </p:sp>
       <p:pic>
         <p:nvPicPr>
           <p:cNvPr id="4099" name="Picture 3" descr="C:\Users\ahmed.alani\Desktop\Work\Presentation\longpolling.png"/>
@@ -5581,7 +5692,7 @@
         </p:blipFill>
         <p:spPr bwMode="auto">
           <a:xfrm>
-            <a:off x="4542885" y="1066800"/>
+            <a:off x="4544973" y="1066799"/>
             <a:ext cx="4382040" cy="5467351"/>
           </a:xfrm>
           <a:prstGeom prst="rect">
@@ -5599,6 +5710,161 @@
           </a:extLst>
         </p:spPr>
       </p:pic>
+      <p:sp>
+        <p:nvSpPr>
+          <p:cNvPr id="5" name="Rectangle 4"/>
+          <p:cNvSpPr/>
+          <p:nvPr/>
+        </p:nvSpPr>
+        <p:spPr>
+          <a:xfrm>
+            <a:off x="228600" y="1143000"/>
+            <a:ext cx="4191000" cy="4801314"/>
+          </a:xfrm>
+          <a:prstGeom prst="rect">
+            <a:avLst/>
+          </a:prstGeom>
+        </p:spPr>
+        <p:txBody>
+          <a:bodyPr wrap="square">
+            <a:spAutoFit/>
+          </a:bodyPr>
+          <a:lstStyle/>
+          <a:p>
+            <a:r>
+              <a:rPr lang="en-US" sz="4000" dirty="0" smtClean="0">
+                <a:solidFill>
+                  <a:schemeClr val="tx1">
+                    <a:lumMod val="65000"/>
+                    <a:lumOff val="35000"/>
+                  </a:schemeClr>
+                </a:solidFill>
+                <a:latin typeface="Yanone Kaffeesatz Bold" pitchFamily="2" charset="0"/>
+              </a:rPr>
+              <a:t>Emulates Server Push</a:t>
+            </a:r>
+            <a:endParaRPr lang="en-US" sz="4000" dirty="0">
+              <a:solidFill>
+                <a:schemeClr val="tx1">
+                  <a:lumMod val="65000"/>
+                  <a:lumOff val="35000"/>
+                </a:schemeClr>
+              </a:solidFill>
+              <a:latin typeface="Yanone Kaffeesatz Bold" pitchFamily="2" charset="0"/>
+            </a:endParaRPr>
+          </a:p>
+          <a:p>
+            <a:pPr marL="742950" lvl="1" indent="-285750">
+              <a:buFont typeface="Arial" pitchFamily="34" charset="0"/>
+              <a:buChar char="•"/>
+            </a:pPr>
+            <a:r>
+              <a:rPr lang="en-US" sz="3000" dirty="0" smtClean="0">
+                <a:solidFill>
+                  <a:schemeClr val="tx1">
+                    <a:lumMod val="65000"/>
+                    <a:lumOff val="35000"/>
+                  </a:schemeClr>
+                </a:solidFill>
+                <a:latin typeface="Yanone Kaffeesatz Bold" pitchFamily="2" charset="0"/>
+                <a:sym typeface="Wingdings" pitchFamily="2" charset="2"/>
+              </a:rPr>
+              <a:t> Latency</a:t>
+            </a:r>
+            <a:endParaRPr lang="en-US" sz="3000" dirty="0">
+              <a:solidFill>
+                <a:schemeClr val="tx1">
+                  <a:lumMod val="65000"/>
+                  <a:lumOff val="35000"/>
+                </a:schemeClr>
+              </a:solidFill>
+              <a:latin typeface="Yanone Kaffeesatz Bold" pitchFamily="2" charset="0"/>
+            </a:endParaRPr>
+          </a:p>
+          <a:p>
+            <a:pPr lvl="1"/>
+            <a:endParaRPr lang="en-US" dirty="0" smtClean="0">
+              <a:solidFill>
+                <a:schemeClr val="tx1">
+                  <a:lumMod val="50000"/>
+                  <a:lumOff val="50000"/>
+                </a:schemeClr>
+              </a:solidFill>
+              <a:latin typeface="Yanone Kaffeesatz Bold" pitchFamily="2" charset="0"/>
+            </a:endParaRPr>
+          </a:p>
+          <a:p>
+            <a:pPr lvl="1"/>
+            <a:endParaRPr lang="en-US" dirty="0">
+              <a:solidFill>
+                <a:schemeClr val="tx1">
+                  <a:lumMod val="50000"/>
+                  <a:lumOff val="50000"/>
+                </a:schemeClr>
+              </a:solidFill>
+              <a:latin typeface="Yanone Kaffeesatz Bold" pitchFamily="2" charset="0"/>
+            </a:endParaRPr>
+          </a:p>
+          <a:p>
+            <a:r>
+              <a:rPr lang="en-US" sz="4000" dirty="0" smtClean="0">
+                <a:solidFill>
+                  <a:schemeClr val="tx1">
+                    <a:lumMod val="65000"/>
+                    <a:lumOff val="35000"/>
+                  </a:schemeClr>
+                </a:solidFill>
+                <a:latin typeface="Yanone Kaffeesatz Bold" pitchFamily="2" charset="0"/>
+              </a:rPr>
+              <a:t>More complex than traditional polling</a:t>
+            </a:r>
+            <a:endParaRPr lang="en-US" sz="4000" dirty="0" smtClean="0">
+              <a:solidFill>
+                <a:schemeClr val="tx1">
+                  <a:lumMod val="65000"/>
+                  <a:lumOff val="35000"/>
+                </a:schemeClr>
+              </a:solidFill>
+              <a:latin typeface="Yanone Kaffeesatz Bold" pitchFamily="2" charset="0"/>
+            </a:endParaRPr>
+          </a:p>
+          <a:p>
+            <a:pPr lvl="1"/>
+            <a:endParaRPr lang="en-US" sz="4000" dirty="0" smtClean="0">
+              <a:solidFill>
+                <a:schemeClr val="tx1">
+                  <a:lumMod val="50000"/>
+                  <a:lumOff val="50000"/>
+                </a:schemeClr>
+              </a:solidFill>
+              <a:latin typeface="Yanone Kaffeesatz Bold" pitchFamily="2" charset="0"/>
+            </a:endParaRPr>
+          </a:p>
+          <a:p>
+            <a:r>
+              <a:rPr lang="en-US" sz="4000" dirty="0" smtClean="0">
+                <a:solidFill>
+                  <a:schemeClr val="tx1">
+                    <a:lumMod val="65000"/>
+                    <a:lumOff val="35000"/>
+                  </a:schemeClr>
+                </a:solidFill>
+                <a:latin typeface="Yanone Kaffeesatz Bold" pitchFamily="2" charset="0"/>
+              </a:rPr>
+              <a:t>Standard AJAX, supported in most browsers</a:t>
+            </a:r>
+            <a:endParaRPr lang="en-US" sz="4000" dirty="0">
+              <a:solidFill>
+                <a:schemeClr val="tx1">
+                  <a:lumMod val="65000"/>
+                  <a:lumOff val="35000"/>
+                </a:schemeClr>
+              </a:solidFill>
+              <a:latin typeface="Yanone Kaffeesatz Bold" pitchFamily="2" charset="0"/>
+            </a:endParaRPr>
+          </a:p>
+        </p:txBody>
+      </p:sp>
     </p:spTree>
     <p:extLst>
       <p:ext uri="{BB962C8B-B14F-4D97-AF65-F5344CB8AC3E}">
@@ -5612,7 +5878,226 @@
   <p:timing>
     <p:tnLst>
       <p:par>
-        <p:cTn id="1" dur="indefinite" restart="never" nodeType="tmRoot"/>
+        <p:cTn id="1" dur="indefinite" restart="never" nodeType="tmRoot">
+          <p:childTnLst>
+            <p:seq concurrent="1" nextAc="seek">
+              <p:cTn id="2" dur="indefinite" nodeType="mainSeq">
+                <p:childTnLst>
+                  <p:par>
+                    <p:cTn id="3" fill="hold">
+                      <p:stCondLst>
+                        <p:cond delay="indefinite"/>
+                      </p:stCondLst>
+                      <p:childTnLst>
+                        <p:par>
+                          <p:cTn id="4" fill="hold">
+                            <p:stCondLst>
+                              <p:cond delay="0"/>
+                            </p:stCondLst>
+                            <p:childTnLst>
+                              <p:par>
+                                <p:cTn id="5" presetID="1" presetClass="entr" presetSubtype="0" fill="hold" nodeType="clickEffect">
+                                  <p:stCondLst>
+                                    <p:cond delay="0"/>
+                                  </p:stCondLst>
+                                  <p:childTnLst>
+                                    <p:set>
+                                      <p:cBhvr>
+                                        <p:cTn id="6" dur="1" fill="hold">
+                                          <p:stCondLst>
+                                            <p:cond delay="0"/>
+                                          </p:stCondLst>
+                                        </p:cTn>
+                                        <p:tgtEl>
+                                          <p:spTgt spid="5">
+                                            <p:txEl>
+                                              <p:pRg st="0" end="0"/>
+                                            </p:txEl>
+                                          </p:spTgt>
+                                        </p:tgtEl>
+                                        <p:attrNameLst>
+                                          <p:attrName>style.visibility</p:attrName>
+                                        </p:attrNameLst>
+                                      </p:cBhvr>
+                                      <p:to>
+                                        <p:strVal val="visible"/>
+                                      </p:to>
+                                    </p:set>
+                                  </p:childTnLst>
+                                </p:cTn>
+                              </p:par>
+                            </p:childTnLst>
+                          </p:cTn>
+                        </p:par>
+                      </p:childTnLst>
+                    </p:cTn>
+                  </p:par>
+                  <p:par>
+                    <p:cTn id="7" fill="hold">
+                      <p:stCondLst>
+                        <p:cond delay="indefinite"/>
+                      </p:stCondLst>
+                      <p:childTnLst>
+                        <p:par>
+                          <p:cTn id="8" fill="hold">
+                            <p:stCondLst>
+                              <p:cond delay="0"/>
+                            </p:stCondLst>
+                            <p:childTnLst>
+                              <p:par>
+                                <p:cTn id="9" presetID="1" presetClass="entr" presetSubtype="0" fill="hold" nodeType="clickEffect">
+                                  <p:stCondLst>
+                                    <p:cond delay="0"/>
+                                  </p:stCondLst>
+                                  <p:childTnLst>
+                                    <p:set>
+                                      <p:cBhvr>
+                                        <p:cTn id="10" dur="1" fill="hold">
+                                          <p:stCondLst>
+                                            <p:cond delay="0"/>
+                                          </p:stCondLst>
+                                        </p:cTn>
+                                        <p:tgtEl>
+                                          <p:spTgt spid="5">
+                                            <p:txEl>
+                                              <p:pRg st="1" end="1"/>
+                                            </p:txEl>
+                                          </p:spTgt>
+                                        </p:tgtEl>
+                                        <p:attrNameLst>
+                                          <p:attrName>style.visibility</p:attrName>
+                                        </p:attrNameLst>
+                                      </p:cBhvr>
+                                      <p:to>
+                                        <p:strVal val="visible"/>
+                                      </p:to>
+                                    </p:set>
+                                  </p:childTnLst>
+                                </p:cTn>
+                              </p:par>
+                            </p:childTnLst>
+                          </p:cTn>
+                        </p:par>
+                      </p:childTnLst>
+                    </p:cTn>
+                  </p:par>
+                  <p:par>
+                    <p:cTn id="11" fill="hold">
+                      <p:stCondLst>
+                        <p:cond delay="indefinite"/>
+                      </p:stCondLst>
+                      <p:childTnLst>
+                        <p:par>
+                          <p:cTn id="12" fill="hold">
+                            <p:stCondLst>
+                              <p:cond delay="0"/>
+                            </p:stCondLst>
+                            <p:childTnLst>
+                              <p:par>
+                                <p:cTn id="13" presetID="1" presetClass="entr" presetSubtype="0" fill="hold" nodeType="clickEffect">
+                                  <p:stCondLst>
+                                    <p:cond delay="0"/>
+                                  </p:stCondLst>
+                                  <p:childTnLst>
+                                    <p:set>
+                                      <p:cBhvr>
+                                        <p:cTn id="14" dur="1" fill="hold">
+                                          <p:stCondLst>
+                                            <p:cond delay="0"/>
+                                          </p:stCondLst>
+                                        </p:cTn>
+                                        <p:tgtEl>
+                                          <p:spTgt spid="5">
+                                            <p:txEl>
+                                              <p:pRg st="4" end="4"/>
+                                            </p:txEl>
+                                          </p:spTgt>
+                                        </p:tgtEl>
+                                        <p:attrNameLst>
+                                          <p:attrName>style.visibility</p:attrName>
+                                        </p:attrNameLst>
+                                      </p:cBhvr>
+                                      <p:to>
+                                        <p:strVal val="visible"/>
+                                      </p:to>
+                                    </p:set>
+                                  </p:childTnLst>
+                                </p:cTn>
+                              </p:par>
+                            </p:childTnLst>
+                          </p:cTn>
+                        </p:par>
+                      </p:childTnLst>
+                    </p:cTn>
+                  </p:par>
+                  <p:par>
+                    <p:cTn id="15" fill="hold">
+                      <p:stCondLst>
+                        <p:cond delay="indefinite"/>
+                      </p:stCondLst>
+                      <p:childTnLst>
+                        <p:par>
+                          <p:cTn id="16" fill="hold">
+                            <p:stCondLst>
+                              <p:cond delay="0"/>
+                            </p:stCondLst>
+                            <p:childTnLst>
+                              <p:par>
+                                <p:cTn id="17" presetID="1" presetClass="entr" presetSubtype="0" fill="hold" nodeType="clickEffect">
+                                  <p:stCondLst>
+                                    <p:cond delay="0"/>
+                                  </p:stCondLst>
+                                  <p:childTnLst>
+                                    <p:set>
+                                      <p:cBhvr>
+                                        <p:cTn id="18" dur="1" fill="hold">
+                                          <p:stCondLst>
+                                            <p:cond delay="0"/>
+                                          </p:stCondLst>
+                                        </p:cTn>
+                                        <p:tgtEl>
+                                          <p:spTgt spid="5">
+                                            <p:txEl>
+                                              <p:pRg st="6" end="6"/>
+                                            </p:txEl>
+                                          </p:spTgt>
+                                        </p:tgtEl>
+                                        <p:attrNameLst>
+                                          <p:attrName>style.visibility</p:attrName>
+                                        </p:attrNameLst>
+                                      </p:cBhvr>
+                                      <p:to>
+                                        <p:strVal val="visible"/>
+                                      </p:to>
+                                    </p:set>
+                                  </p:childTnLst>
+                                </p:cTn>
+                              </p:par>
+                            </p:childTnLst>
+                          </p:cTn>
+                        </p:par>
+                      </p:childTnLst>
+                    </p:cTn>
+                  </p:par>
+                </p:childTnLst>
+              </p:cTn>
+              <p:prevCondLst>
+                <p:cond evt="onPrev" delay="0">
+                  <p:tgtEl>
+                    <p:sldTgt/>
+                  </p:tgtEl>
+                </p:cond>
+              </p:prevCondLst>
+              <p:nextCondLst>
+                <p:cond evt="onNext" delay="0">
+                  <p:tgtEl>
+                    <p:sldTgt/>
+                  </p:tgtEl>
+                </p:cond>
+              </p:nextCondLst>
+            </p:seq>
+          </p:childTnLst>
+        </p:cTn>
       </p:par>
     </p:tnLst>
   </p:timing>
@@ -5885,6 +6370,90 @@
         </p:nvSpPr>
         <p:spPr>
           <a:xfrm>
+            <a:off x="381000" y="2667000"/>
+            <a:ext cx="8382000" cy="1470025"/>
+          </a:xfrm>
+          <a:ln>
+            <a:noFill/>
+          </a:ln>
+        </p:spPr>
+        <p:txBody>
+          <a:bodyPr>
+            <a:noAutofit/>
+          </a:bodyPr>
+          <a:lstStyle/>
+          <a:p>
+            <a:r>
+              <a:rPr lang="en-US" sz="17000" dirty="0" smtClean="0">
+                <a:solidFill>
+                  <a:schemeClr val="accent2">
+                    <a:lumMod val="75000"/>
+                  </a:schemeClr>
+                </a:solidFill>
+                <a:latin typeface="Yanone Kaffeesatz Bold" pitchFamily="2" charset="0"/>
+                <a:cs typeface="Aharoni" pitchFamily="2" charset="-79"/>
+              </a:rPr>
+              <a:t>BETTER!</a:t>
+            </a:r>
+            <a:endParaRPr lang="en-US" sz="17000" dirty="0">
+              <a:solidFill>
+                <a:srgbClr val="F0F2EB"/>
+              </a:solidFill>
+              <a:latin typeface="Yanone Kaffeesatz Bold" pitchFamily="2" charset="0"/>
+              <a:cs typeface="Aharoni" pitchFamily="2" charset="-79"/>
+            </a:endParaRPr>
+          </a:p>
+        </p:txBody>
+      </p:sp>
+    </p:spTree>
+    <p:extLst>
+      <p:ext uri="{BB962C8B-B14F-4D97-AF65-F5344CB8AC3E}">
+        <p14:creationId xmlns:p14="http://schemas.microsoft.com/office/powerpoint/2010/main" val="3877388153"/>
+      </p:ext>
+    </p:extLst>
+  </p:cSld>
+  <p:clrMapOvr>
+    <a:masterClrMapping/>
+  </p:clrMapOvr>
+  <p:timing>
+    <p:tnLst>
+      <p:par>
+        <p:cTn id="1" dur="indefinite" restart="never" nodeType="tmRoot"/>
+      </p:par>
+    </p:tnLst>
+  </p:timing>
+</p:sld>
+</file>
+
+<file path=ppt/slides/slide13.xml><?xml version="1.0" encoding="utf-8"?>
+<p:sld xmlns:a="http://schemas.openxmlformats.org/drawingml/2006/main" xmlns:r="http://schemas.openxmlformats.org/officeDocument/2006/relationships" xmlns:p="http://schemas.openxmlformats.org/presentationml/2006/main">
+  <p:cSld>
+    <p:spTree>
+      <p:nvGrpSpPr>
+        <p:cNvPr id="1" name=""/>
+        <p:cNvGrpSpPr/>
+        <p:nvPr/>
+      </p:nvGrpSpPr>
+      <p:grpSpPr>
+        <a:xfrm>
+          <a:off x="0" y="0"/>
+          <a:ext cx="0" cy="0"/>
+          <a:chOff x="0" y="0"/>
+          <a:chExt cx="0" cy="0"/>
+        </a:xfrm>
+      </p:grpSpPr>
+      <p:sp>
+        <p:nvSpPr>
+          <p:cNvPr id="2" name="Title 1"/>
+          <p:cNvSpPr>
+            <a:spLocks noGrp="1"/>
+          </p:cNvSpPr>
+          <p:nvPr>
+            <p:ph type="ctrTitle"/>
+          </p:nvPr>
+        </p:nvSpPr>
+        <p:spPr>
+          <a:xfrm>
             <a:off x="76200" y="-228600"/>
             <a:ext cx="7772400" cy="1470025"/>
           </a:xfrm>
@@ -6107,7 +6676,7 @@
 </p:sld>
 </file>
 
-<file path=ppt/slides/slide13.xml><?xml version="1.0" encoding="utf-8"?>
+<file path=ppt/slides/slide14.xml><?xml version="1.0" encoding="utf-8"?>
 <p:sld xmlns:a="http://schemas.openxmlformats.org/drawingml/2006/main" xmlns:r="http://schemas.openxmlformats.org/officeDocument/2006/relationships" xmlns:p="http://schemas.openxmlformats.org/presentationml/2006/main">
   <p:cSld>
     <p:spTree>
@@ -6150,7 +6719,7 @@
           <a:lstStyle/>
           <a:p>
             <a:r>
-              <a:rPr lang="en-US" sz="9000" dirty="0" smtClean="0">
+              <a:rPr lang="en-US" sz="25000" dirty="0" smtClean="0">
                 <a:solidFill>
                   <a:schemeClr val="accent2">
                     <a:lumMod val="75000"/>
@@ -6159,19 +6728,9 @@
                 <a:latin typeface="Yanone Kaffeesatz Bold" pitchFamily="2" charset="0"/>
                 <a:cs typeface="Aharoni" pitchFamily="2" charset="-79"/>
               </a:rPr>
-              <a:t>Got anything else?</a:t>
-            </a:r>
-            <a:r>
-              <a:rPr lang="en-US" sz="15000" dirty="0" smtClean="0">
-                <a:solidFill>
-                  <a:srgbClr val="F0F2EB"/>
-                </a:solidFill>
-                <a:latin typeface="Yanone Kaffeesatz Bold" pitchFamily="2" charset="0"/>
-                <a:cs typeface="Aharoni" pitchFamily="2" charset="-79"/>
-              </a:rPr>
-              <a:t>?</a:t>
-            </a:r>
-            <a:endParaRPr lang="en-US" sz="15000" dirty="0">
+              <a:t>BETTER!</a:t>
+            </a:r>
+            <a:endParaRPr lang="en-US" sz="25000" dirty="0">
               <a:solidFill>
                 <a:srgbClr val="F0F2EB"/>
               </a:solidFill>
@@ -6184,7 +6743,7 @@
     </p:spTree>
     <p:extLst>
       <p:ext uri="{BB962C8B-B14F-4D97-AF65-F5344CB8AC3E}">
-        <p14:creationId xmlns:p14="http://schemas.microsoft.com/office/powerpoint/2010/main" val="865043419"/>
+        <p14:creationId xmlns:p14="http://schemas.microsoft.com/office/powerpoint/2010/main" val="2979681292"/>
       </p:ext>
     </p:extLst>
   </p:cSld>
@@ -6201,7 +6760,429 @@
 </p:sld>
 </file>
 
-<file path=ppt/slides/slide14.xml><?xml version="1.0" encoding="utf-8"?>
+<file path=ppt/slides/slide15.xml><?xml version="1.0" encoding="utf-8"?>
+<p:sld xmlns:a="http://schemas.openxmlformats.org/drawingml/2006/main" xmlns:r="http://schemas.openxmlformats.org/officeDocument/2006/relationships" xmlns:p="http://schemas.openxmlformats.org/presentationml/2006/main">
+  <p:cSld>
+    <p:spTree>
+      <p:nvGrpSpPr>
+        <p:cNvPr id="1" name=""/>
+        <p:cNvGrpSpPr/>
+        <p:nvPr/>
+      </p:nvGrpSpPr>
+      <p:grpSpPr>
+        <a:xfrm>
+          <a:off x="0" y="0"/>
+          <a:ext cx="0" cy="0"/>
+          <a:chOff x="0" y="0"/>
+          <a:chExt cx="0" cy="0"/>
+        </a:xfrm>
+      </p:grpSpPr>
+      <p:sp>
+        <p:nvSpPr>
+          <p:cNvPr id="2" name="Title 1"/>
+          <p:cNvSpPr>
+            <a:spLocks noGrp="1"/>
+          </p:cNvSpPr>
+          <p:nvPr>
+            <p:ph type="ctrTitle"/>
+          </p:nvPr>
+        </p:nvSpPr>
+        <p:spPr>
+          <a:xfrm>
+            <a:off x="76200" y="-228600"/>
+            <a:ext cx="7772400" cy="1470025"/>
+          </a:xfrm>
+          <a:ln>
+            <a:noFill/>
+          </a:ln>
+        </p:spPr>
+        <p:txBody>
+          <a:bodyPr>
+            <a:noAutofit/>
+          </a:bodyPr>
+          <a:lstStyle/>
+          <a:p>
+            <a:pPr algn="l"/>
+            <a:r>
+              <a:rPr lang="en-US" sz="8000" dirty="0" err="1" smtClean="0">
+                <a:solidFill>
+                  <a:schemeClr val="tx2">
+                    <a:lumMod val="60000"/>
+                    <a:lumOff val="40000"/>
+                  </a:schemeClr>
+                </a:solidFill>
+                <a:latin typeface="Yanone Kaffeesatz Bold" pitchFamily="2" charset="0"/>
+                <a:cs typeface="Aharoni" pitchFamily="2" charset="-79"/>
+              </a:rPr>
+              <a:t>WebSocket</a:t>
+            </a:r>
+            <a:r>
+              <a:rPr lang="en-US" sz="8000" dirty="0" smtClean="0">
+                <a:solidFill>
+                  <a:schemeClr val="tx2">
+                    <a:lumMod val="60000"/>
+                    <a:lumOff val="40000"/>
+                  </a:schemeClr>
+                </a:solidFill>
+                <a:latin typeface="Yanone Kaffeesatz Bold" pitchFamily="2" charset="0"/>
+                <a:cs typeface="Aharoni" pitchFamily="2" charset="-79"/>
+              </a:rPr>
+              <a:t> </a:t>
+            </a:r>
+            <a:endParaRPr lang="en-US" sz="8000" dirty="0">
+              <a:solidFill>
+                <a:schemeClr val="tx2">
+                  <a:lumMod val="60000"/>
+                  <a:lumOff val="40000"/>
+                </a:schemeClr>
+              </a:solidFill>
+              <a:latin typeface="Yanone Kaffeesatz Bold" pitchFamily="2" charset="0"/>
+              <a:cs typeface="Aharoni" pitchFamily="2" charset="-79"/>
+            </a:endParaRPr>
+          </a:p>
+        </p:txBody>
+      </p:sp>
+      <p:pic>
+        <p:nvPicPr>
+          <p:cNvPr id="6146" name="Picture 2" descr="C:\Users\ahmed.alani\Desktop\Work\Presentation\websocket.png"/>
+          <p:cNvPicPr>
+            <a:picLocks noChangeAspect="1" noChangeArrowheads="1"/>
+          </p:cNvPicPr>
+          <p:nvPr/>
+        </p:nvPicPr>
+        <p:blipFill>
+          <a:blip r:embed="rId3">
+            <a:extLst>
+              <a:ext uri="{28A0092B-C50C-407E-A947-70E740481C1C}">
+                <a14:useLocalDpi xmlns:a14="http://schemas.microsoft.com/office/drawing/2010/main" val="0"/>
+              </a:ext>
+            </a:extLst>
+          </a:blip>
+          <a:srcRect/>
+          <a:stretch>
+            <a:fillRect/>
+          </a:stretch>
+        </p:blipFill>
+        <p:spPr bwMode="auto">
+          <a:xfrm>
+            <a:off x="4944116" y="1314453"/>
+            <a:ext cx="4047484" cy="5059358"/>
+          </a:xfrm>
+          <a:prstGeom prst="rect">
+            <a:avLst/>
+          </a:prstGeom>
+          <a:noFill/>
+          <a:extLst>
+            <a:ext uri="{909E8E84-426E-40DD-AFC4-6F175D3DCCD1}">
+              <a14:hiddenFill xmlns:a14="http://schemas.microsoft.com/office/drawing/2010/main">
+                <a:solidFill>
+                  <a:srgbClr val="FFFFFF"/>
+                </a:solidFill>
+              </a14:hiddenFill>
+            </a:ext>
+          </a:extLst>
+        </p:spPr>
+      </p:pic>
+      <p:sp>
+        <p:nvSpPr>
+          <p:cNvPr id="4" name="Rectangle 3"/>
+          <p:cNvSpPr/>
+          <p:nvPr/>
+        </p:nvSpPr>
+        <p:spPr>
+          <a:xfrm>
+            <a:off x="228600" y="1143000"/>
+            <a:ext cx="4648200" cy="5570756"/>
+          </a:xfrm>
+          <a:prstGeom prst="rect">
+            <a:avLst/>
+          </a:prstGeom>
+        </p:spPr>
+        <p:txBody>
+          <a:bodyPr wrap="square">
+            <a:spAutoFit/>
+          </a:bodyPr>
+          <a:lstStyle/>
+          <a:p>
+            <a:r>
+              <a:rPr lang="en-US" sz="4000" dirty="0" smtClean="0">
+                <a:solidFill>
+                  <a:schemeClr val="tx1">
+                    <a:lumMod val="65000"/>
+                    <a:lumOff val="35000"/>
+                  </a:schemeClr>
+                </a:solidFill>
+                <a:latin typeface="Yanone Kaffeesatz Bold" pitchFamily="2" charset="0"/>
+              </a:rPr>
+              <a:t>Full-duplex, bi-directional connection to server</a:t>
+            </a:r>
+            <a:endParaRPr lang="en-US" sz="3000" dirty="0" smtClean="0">
+              <a:solidFill>
+                <a:schemeClr val="tx1">
+                  <a:lumMod val="65000"/>
+                  <a:lumOff val="35000"/>
+                </a:schemeClr>
+              </a:solidFill>
+              <a:latin typeface="Yanone Kaffeesatz Bold" pitchFamily="2" charset="0"/>
+            </a:endParaRPr>
+          </a:p>
+          <a:p>
+            <a:pPr lvl="1"/>
+            <a:endParaRPr lang="en-US" dirty="0" smtClean="0">
+              <a:solidFill>
+                <a:schemeClr val="tx1">
+                  <a:lumMod val="50000"/>
+                  <a:lumOff val="50000"/>
+                </a:schemeClr>
+              </a:solidFill>
+              <a:latin typeface="Yanone Kaffeesatz Bold" pitchFamily="2" charset="0"/>
+            </a:endParaRPr>
+          </a:p>
+          <a:p>
+            <a:pPr lvl="1"/>
+            <a:endParaRPr lang="en-US" dirty="0">
+              <a:solidFill>
+                <a:schemeClr val="tx1">
+                  <a:lumMod val="50000"/>
+                  <a:lumOff val="50000"/>
+                </a:schemeClr>
+              </a:solidFill>
+              <a:latin typeface="Yanone Kaffeesatz Bold" pitchFamily="2" charset="0"/>
+            </a:endParaRPr>
+          </a:p>
+          <a:p>
+            <a:r>
+              <a:rPr lang="en-US" sz="4000" dirty="0">
+                <a:solidFill>
+                  <a:schemeClr val="tx1">
+                    <a:lumMod val="65000"/>
+                    <a:lumOff val="35000"/>
+                  </a:schemeClr>
+                </a:solidFill>
+                <a:latin typeface="Yanone Kaffeesatz Bold" pitchFamily="2" charset="0"/>
+              </a:rPr>
+              <a:t>No polling, server can initiate calls after initial upgrade request</a:t>
+            </a:r>
+          </a:p>
+          <a:p>
+            <a:pPr lvl="1"/>
+            <a:endParaRPr lang="en-US" sz="4000" dirty="0" smtClean="0">
+              <a:solidFill>
+                <a:schemeClr val="tx1">
+                  <a:lumMod val="50000"/>
+                  <a:lumOff val="50000"/>
+                </a:schemeClr>
+              </a:solidFill>
+              <a:latin typeface="Yanone Kaffeesatz Bold" pitchFamily="2" charset="0"/>
+            </a:endParaRPr>
+          </a:p>
+          <a:p>
+            <a:r>
+              <a:rPr lang="en-US" sz="4000" dirty="0">
+                <a:solidFill>
+                  <a:schemeClr val="tx1">
+                    <a:lumMod val="65000"/>
+                    <a:lumOff val="35000"/>
+                  </a:schemeClr>
+                </a:solidFill>
+                <a:latin typeface="Yanone Kaffeesatz Bold" pitchFamily="2" charset="0"/>
+              </a:rPr>
+              <a:t>HTML5 component, W3C API, protocol IETF</a:t>
+            </a:r>
+          </a:p>
+        </p:txBody>
+      </p:sp>
+    </p:spTree>
+    <p:extLst>
+      <p:ext uri="{BB962C8B-B14F-4D97-AF65-F5344CB8AC3E}">
+        <p14:creationId xmlns:p14="http://schemas.microsoft.com/office/powerpoint/2010/main" val="1373403411"/>
+      </p:ext>
+    </p:extLst>
+  </p:cSld>
+  <p:clrMapOvr>
+    <a:masterClrMapping/>
+  </p:clrMapOvr>
+  <p:timing>
+    <p:tnLst>
+      <p:par>
+        <p:cTn id="1" dur="indefinite" restart="never" nodeType="tmRoot">
+          <p:childTnLst>
+            <p:seq concurrent="1" nextAc="seek">
+              <p:cTn id="2" dur="indefinite" nodeType="mainSeq">
+                <p:childTnLst>
+                  <p:par>
+                    <p:cTn id="3" fill="hold">
+                      <p:stCondLst>
+                        <p:cond delay="indefinite"/>
+                      </p:stCondLst>
+                      <p:childTnLst>
+                        <p:par>
+                          <p:cTn id="4" fill="hold">
+                            <p:stCondLst>
+                              <p:cond delay="0"/>
+                            </p:stCondLst>
+                            <p:childTnLst>
+                              <p:par>
+                                <p:cTn id="5" presetID="1" presetClass="entr" presetSubtype="0" fill="hold" nodeType="clickEffect">
+                                  <p:stCondLst>
+                                    <p:cond delay="0"/>
+                                  </p:stCondLst>
+                                  <p:childTnLst>
+                                    <p:set>
+                                      <p:cBhvr>
+                                        <p:cTn id="6" dur="1" fill="hold">
+                                          <p:stCondLst>
+                                            <p:cond delay="0"/>
+                                          </p:stCondLst>
+                                        </p:cTn>
+                                        <p:tgtEl>
+                                          <p:spTgt spid="4">
+                                            <p:txEl>
+                                              <p:pRg st="0" end="0"/>
+                                            </p:txEl>
+                                          </p:spTgt>
+                                        </p:tgtEl>
+                                        <p:attrNameLst>
+                                          <p:attrName>style.visibility</p:attrName>
+                                        </p:attrNameLst>
+                                      </p:cBhvr>
+                                      <p:to>
+                                        <p:strVal val="visible"/>
+                                      </p:to>
+                                    </p:set>
+                                  </p:childTnLst>
+                                </p:cTn>
+                              </p:par>
+                            </p:childTnLst>
+                          </p:cTn>
+                        </p:par>
+                      </p:childTnLst>
+                    </p:cTn>
+                  </p:par>
+                  <p:par>
+                    <p:cTn id="7" fill="hold">
+                      <p:stCondLst>
+                        <p:cond delay="indefinite"/>
+                      </p:stCondLst>
+                      <p:childTnLst>
+                        <p:par>
+                          <p:cTn id="8" fill="hold">
+                            <p:stCondLst>
+                              <p:cond delay="0"/>
+                            </p:stCondLst>
+                            <p:childTnLst>
+                              <p:par>
+                                <p:cTn id="9" presetID="1" presetClass="entr" presetSubtype="0" fill="hold" nodeType="clickEffect">
+                                  <p:stCondLst>
+                                    <p:cond delay="0"/>
+                                  </p:stCondLst>
+                                  <p:childTnLst>
+                                    <p:set>
+                                      <p:cBhvr>
+                                        <p:cTn id="10" dur="1" fill="hold">
+                                          <p:stCondLst>
+                                            <p:cond delay="0"/>
+                                          </p:stCondLst>
+                                        </p:cTn>
+                                        <p:tgtEl>
+                                          <p:spTgt spid="4">
+                                            <p:txEl>
+                                              <p:pRg st="3" end="3"/>
+                                            </p:txEl>
+                                          </p:spTgt>
+                                        </p:tgtEl>
+                                        <p:attrNameLst>
+                                          <p:attrName>style.visibility</p:attrName>
+                                        </p:attrNameLst>
+                                      </p:cBhvr>
+                                      <p:to>
+                                        <p:strVal val="visible"/>
+                                      </p:to>
+                                    </p:set>
+                                  </p:childTnLst>
+                                </p:cTn>
+                              </p:par>
+                            </p:childTnLst>
+                          </p:cTn>
+                        </p:par>
+                      </p:childTnLst>
+                    </p:cTn>
+                  </p:par>
+                  <p:par>
+                    <p:cTn id="11" fill="hold">
+                      <p:stCondLst>
+                        <p:cond delay="indefinite"/>
+                      </p:stCondLst>
+                      <p:childTnLst>
+                        <p:par>
+                          <p:cTn id="12" fill="hold">
+                            <p:stCondLst>
+                              <p:cond delay="0"/>
+                            </p:stCondLst>
+                            <p:childTnLst>
+                              <p:par>
+                                <p:cTn id="13" presetID="1" presetClass="entr" presetSubtype="0" fill="hold" nodeType="clickEffect">
+                                  <p:stCondLst>
+                                    <p:cond delay="0"/>
+                                  </p:stCondLst>
+                                  <p:childTnLst>
+                                    <p:set>
+                                      <p:cBhvr>
+                                        <p:cTn id="14" dur="1" fill="hold">
+                                          <p:stCondLst>
+                                            <p:cond delay="0"/>
+                                          </p:stCondLst>
+                                        </p:cTn>
+                                        <p:tgtEl>
+                                          <p:spTgt spid="4">
+                                            <p:txEl>
+                                              <p:charRg st="120" end="160"/>
+                                            </p:txEl>
+                                          </p:spTgt>
+                                        </p:tgtEl>
+                                        <p:attrNameLst>
+                                          <p:attrName>style.visibility</p:attrName>
+                                        </p:attrNameLst>
+                                      </p:cBhvr>
+                                      <p:to>
+                                        <p:strVal val="visible"/>
+                                      </p:to>
+                                    </p:set>
+                                  </p:childTnLst>
+                                </p:cTn>
+                              </p:par>
+                            </p:childTnLst>
+                          </p:cTn>
+                        </p:par>
+                      </p:childTnLst>
+                    </p:cTn>
+                  </p:par>
+                </p:childTnLst>
+              </p:cTn>
+              <p:prevCondLst>
+                <p:cond evt="onPrev" delay="0">
+                  <p:tgtEl>
+                    <p:sldTgt/>
+                  </p:tgtEl>
+                </p:cond>
+              </p:prevCondLst>
+              <p:nextCondLst>
+                <p:cond evt="onNext" delay="0">
+                  <p:tgtEl>
+                    <p:sldTgt/>
+                  </p:tgtEl>
+                </p:cond>
+              </p:nextCondLst>
+            </p:seq>
+          </p:childTnLst>
+        </p:cTn>
+      </p:par>
+    </p:tnLst>
+  </p:timing>
+</p:sld>
+</file>
+
+<file path=ppt/slides/slide16.xml><?xml version="1.0" encoding="utf-8"?>
 <p:sld xmlns:a="http://schemas.openxmlformats.org/drawingml/2006/main" xmlns:r="http://schemas.openxmlformats.org/officeDocument/2006/relationships" xmlns:p="http://schemas.openxmlformats.org/presentationml/2006/main">
   <p:cSld>
     <p:bg>
@@ -6549,7 +7530,7 @@
 </p:sld>
 </file>
 
-<file path=ppt/slides/slide15.xml><?xml version="1.0" encoding="utf-8"?>
+<file path=ppt/slides/slide17.xml><?xml version="1.0" encoding="utf-8"?>
 <p:sld xmlns:a="http://schemas.openxmlformats.org/drawingml/2006/main" xmlns:r="http://schemas.openxmlformats.org/officeDocument/2006/relationships" xmlns:p="http://schemas.openxmlformats.org/presentationml/2006/main">
   <p:cSld>
     <p:spTree>
@@ -6593,7 +7574,7 @@
           <a:p>
             <a:pPr algn="l"/>
             <a:r>
-              <a:rPr lang="en-US" sz="8000" dirty="0" err="1" smtClean="0">
+              <a:rPr lang="en-US" sz="8000" dirty="0" smtClean="0">
                 <a:solidFill>
                   <a:schemeClr val="tx2">
                     <a:lumMod val="60000"/>
@@ -6603,20 +7584,7 @@
                 <a:latin typeface="Yanone Kaffeesatz Bold" pitchFamily="2" charset="0"/>
                 <a:cs typeface="Aharoni" pitchFamily="2" charset="-79"/>
               </a:rPr>
-              <a:t>WebSocket</a:t>
-            </a:r>
-            <a:r>
-              <a:rPr lang="en-US" sz="8000" dirty="0" smtClean="0">
-                <a:solidFill>
-                  <a:schemeClr val="tx2">
-                    <a:lumMod val="60000"/>
-                    <a:lumOff val="40000"/>
-                  </a:schemeClr>
-                </a:solidFill>
-                <a:latin typeface="Yanone Kaffeesatz Bold" pitchFamily="2" charset="0"/>
-                <a:cs typeface="Aharoni" pitchFamily="2" charset="-79"/>
-              </a:rPr>
-              <a:t> </a:t>
+              <a:t>Browser Support</a:t>
             </a:r>
             <a:endParaRPr lang="en-US" sz="8000" dirty="0">
               <a:solidFill>
@@ -6633,306 +7601,14 @@
       </p:sp>
       <p:pic>
         <p:nvPicPr>
-          <p:cNvPr id="6146" name="Picture 2" descr="C:\Users\ahmed.alani\Desktop\Work\Presentation\websocket.png"/>
-          <p:cNvPicPr>
-            <a:picLocks noChangeAspect="1" noChangeArrowheads="1"/>
-          </p:cNvPicPr>
-          <p:nvPr/>
-        </p:nvPicPr>
-        <p:blipFill>
-          <a:blip r:embed="rId3">
-            <a:extLst>
-              <a:ext uri="{28A0092B-C50C-407E-A947-70E740481C1C}">
-                <a14:useLocalDpi xmlns:a14="http://schemas.microsoft.com/office/drawing/2010/main" val="0"/>
-              </a:ext>
-            </a:extLst>
-          </a:blip>
-          <a:srcRect/>
-          <a:stretch>
-            <a:fillRect/>
-          </a:stretch>
-        </p:blipFill>
-        <p:spPr bwMode="auto">
-          <a:xfrm>
-            <a:off x="5105398" y="1600200"/>
-            <a:ext cx="3590289" cy="4487863"/>
-          </a:xfrm>
-          <a:prstGeom prst="rect">
-            <a:avLst/>
-          </a:prstGeom>
-          <a:noFill/>
-          <a:extLst>
-            <a:ext uri="{909E8E84-426E-40DD-AFC4-6F175D3DCCD1}">
-              <a14:hiddenFill xmlns:a14="http://schemas.microsoft.com/office/drawing/2010/main">
-                <a:solidFill>
-                  <a:srgbClr val="FFFFFF"/>
-                </a:solidFill>
-              </a14:hiddenFill>
-            </a:ext>
-          </a:extLst>
-        </p:spPr>
-      </p:pic>
-    </p:spTree>
-    <p:extLst>
-      <p:ext uri="{BB962C8B-B14F-4D97-AF65-F5344CB8AC3E}">
-        <p14:creationId xmlns:p14="http://schemas.microsoft.com/office/powerpoint/2010/main" val="1373403411"/>
-      </p:ext>
-    </p:extLst>
-  </p:cSld>
-  <p:clrMapOvr>
-    <a:masterClrMapping/>
-  </p:clrMapOvr>
-  <p:timing>
-    <p:tnLst>
-      <p:par>
-        <p:cTn id="1" dur="indefinite" restart="never" nodeType="tmRoot"/>
-      </p:par>
-    </p:tnLst>
-  </p:timing>
-</p:sld>
-</file>
-
-<file path=ppt/slides/slide16.xml><?xml version="1.0" encoding="utf-8"?>
-<p:sld xmlns:a="http://schemas.openxmlformats.org/drawingml/2006/main" xmlns:r="http://schemas.openxmlformats.org/officeDocument/2006/relationships" xmlns:p="http://schemas.openxmlformats.org/presentationml/2006/main">
-  <p:cSld>
-    <p:spTree>
-      <p:nvGrpSpPr>
-        <p:cNvPr id="1" name=""/>
-        <p:cNvGrpSpPr/>
-        <p:nvPr/>
-      </p:nvGrpSpPr>
-      <p:grpSpPr>
-        <a:xfrm>
-          <a:off x="0" y="0"/>
-          <a:ext cx="0" cy="0"/>
-          <a:chOff x="0" y="0"/>
-          <a:chExt cx="0" cy="0"/>
-        </a:xfrm>
-      </p:grpSpPr>
-      <p:sp>
-        <p:nvSpPr>
-          <p:cNvPr id="2" name="Title 1"/>
-          <p:cNvSpPr>
-            <a:spLocks noGrp="1"/>
-          </p:cNvSpPr>
-          <p:nvPr>
-            <p:ph type="ctrTitle"/>
-          </p:nvPr>
-        </p:nvSpPr>
-        <p:spPr>
-          <a:xfrm>
-            <a:off x="76200" y="-228600"/>
-            <a:ext cx="7772400" cy="1470025"/>
-          </a:xfrm>
-          <a:ln>
-            <a:noFill/>
-          </a:ln>
-        </p:spPr>
-        <p:txBody>
-          <a:bodyPr>
-            <a:noAutofit/>
-          </a:bodyPr>
-          <a:lstStyle/>
-          <a:p>
-            <a:pPr algn="l"/>
-            <a:r>
-              <a:rPr lang="en-US" sz="8000" dirty="0" err="1" smtClean="0">
-                <a:solidFill>
-                  <a:schemeClr val="tx2">
-                    <a:lumMod val="60000"/>
-                    <a:lumOff val="40000"/>
-                  </a:schemeClr>
-                </a:solidFill>
-                <a:latin typeface="Yanone Kaffeesatz Bold" pitchFamily="2" charset="0"/>
-                <a:cs typeface="Aharoni" pitchFamily="2" charset="-79"/>
-              </a:rPr>
-              <a:t>WebSocket</a:t>
-            </a:r>
-            <a:r>
-              <a:rPr lang="en-US" sz="8000" dirty="0" smtClean="0">
-                <a:solidFill>
-                  <a:schemeClr val="tx2">
-                    <a:lumMod val="60000"/>
-                    <a:lumOff val="40000"/>
-                  </a:schemeClr>
-                </a:solidFill>
-                <a:latin typeface="Yanone Kaffeesatz Bold" pitchFamily="2" charset="0"/>
-                <a:cs typeface="Aharoni" pitchFamily="2" charset="-79"/>
-              </a:rPr>
-              <a:t> </a:t>
-            </a:r>
-            <a:endParaRPr lang="en-US" sz="8000" dirty="0">
-              <a:solidFill>
-                <a:schemeClr val="tx2">
-                  <a:lumMod val="60000"/>
-                  <a:lumOff val="40000"/>
-                </a:schemeClr>
-              </a:solidFill>
-              <a:latin typeface="Yanone Kaffeesatz Bold" pitchFamily="2" charset="0"/>
-              <a:cs typeface="Aharoni" pitchFamily="2" charset="-79"/>
-            </a:endParaRPr>
-          </a:p>
-        </p:txBody>
-      </p:sp>
-      <p:sp>
-        <p:nvSpPr>
-          <p:cNvPr id="3" name="Subtitle 2"/>
-          <p:cNvSpPr>
-            <a:spLocks noGrp="1"/>
-          </p:cNvSpPr>
-          <p:nvPr>
-            <p:ph type="subTitle" idx="1"/>
-          </p:nvPr>
-        </p:nvSpPr>
-        <p:spPr>
-          <a:xfrm>
-            <a:off x="228600" y="1066800"/>
-            <a:ext cx="8763000" cy="5486400"/>
-          </a:xfrm>
-        </p:spPr>
-        <p:txBody>
-          <a:bodyPr>
-            <a:noAutofit/>
-          </a:bodyPr>
-          <a:lstStyle/>
-          <a:p>
-            <a:pPr marL="857250" indent="-857250" algn="l">
-              <a:buFont typeface="Arial" pitchFamily="34" charset="0"/>
-              <a:buChar char="•"/>
-            </a:pPr>
-            <a:r>
-              <a:rPr lang="en-US" sz="4800" dirty="0" smtClean="0">
-                <a:solidFill>
-                  <a:schemeClr val="tx1">
-                    <a:lumMod val="50000"/>
-                    <a:lumOff val="50000"/>
-                  </a:schemeClr>
-                </a:solidFill>
-                <a:latin typeface="Yanone Kaffeesatz Bold" pitchFamily="2" charset="0"/>
-              </a:rPr>
-              <a:t>Full-duplex, bi-directional connection to a server</a:t>
-            </a:r>
-          </a:p>
-          <a:p>
-            <a:pPr marL="857250" indent="-857250" algn="l">
-              <a:buFont typeface="Arial" pitchFamily="34" charset="0"/>
-              <a:buChar char="•"/>
-            </a:pPr>
-            <a:r>
-              <a:rPr lang="en-US" sz="4800" dirty="0" smtClean="0">
-                <a:solidFill>
-                  <a:schemeClr val="tx1">
-                    <a:lumMod val="50000"/>
-                    <a:lumOff val="50000"/>
-                  </a:schemeClr>
-                </a:solidFill>
-                <a:latin typeface="Yanone Kaffeesatz Bold" pitchFamily="2" charset="0"/>
-              </a:rPr>
-              <a:t>Little overhead per message relative to HTTP</a:t>
-            </a:r>
-          </a:p>
-          <a:p>
-            <a:pPr marL="857250" indent="-857250" algn="l">
-              <a:buFont typeface="Arial" pitchFamily="34" charset="0"/>
-              <a:buChar char="•"/>
-            </a:pPr>
-            <a:r>
-              <a:rPr lang="en-US" sz="4800" dirty="0" smtClean="0">
-                <a:solidFill>
-                  <a:schemeClr val="tx1">
-                    <a:lumMod val="50000"/>
-                    <a:lumOff val="50000"/>
-                  </a:schemeClr>
-                </a:solidFill>
-                <a:latin typeface="Yanone Kaffeesatz Bold" pitchFamily="2" charset="0"/>
-              </a:rPr>
-              <a:t>No polling, server can initiate calls after initial upgrade request</a:t>
-            </a:r>
-            <a:endParaRPr lang="en-US" sz="4800" dirty="0">
-              <a:solidFill>
-                <a:schemeClr val="tx1">
-                  <a:lumMod val="50000"/>
-                  <a:lumOff val="50000"/>
-                </a:schemeClr>
-              </a:solidFill>
-              <a:latin typeface="Yanone Kaffeesatz Bold" pitchFamily="2" charset="0"/>
-            </a:endParaRPr>
-          </a:p>
-          <a:p>
-            <a:pPr marL="857250" indent="-857250" algn="l">
-              <a:buFont typeface="Arial" pitchFamily="34" charset="0"/>
-              <a:buChar char="•"/>
-            </a:pPr>
-            <a:r>
-              <a:rPr lang="en-US" sz="4800" dirty="0" smtClean="0">
-                <a:solidFill>
-                  <a:schemeClr val="tx1">
-                    <a:lumMod val="50000"/>
-                    <a:lumOff val="50000"/>
-                  </a:schemeClr>
-                </a:solidFill>
-                <a:latin typeface="Yanone Kaffeesatz Bold" pitchFamily="2" charset="0"/>
-              </a:rPr>
-              <a:t>HTML5 component, W3C API, protocol IETF</a:t>
-            </a:r>
-          </a:p>
-        </p:txBody>
-      </p:sp>
-    </p:spTree>
-    <p:extLst>
-      <p:ext uri="{BB962C8B-B14F-4D97-AF65-F5344CB8AC3E}">
-        <p14:creationId xmlns:p14="http://schemas.microsoft.com/office/powerpoint/2010/main" val="842976841"/>
-      </p:ext>
-    </p:extLst>
-  </p:cSld>
-  <p:clrMapOvr>
-    <a:masterClrMapping/>
-  </p:clrMapOvr>
-  <p:timing>
-    <p:tnLst>
-      <p:par>
-        <p:cTn id="1" dur="indefinite" restart="never" nodeType="tmRoot"/>
-      </p:par>
-    </p:tnLst>
-  </p:timing>
-</p:sld>
-</file>
-
-<file path=ppt/slides/slide17.xml><?xml version="1.0" encoding="utf-8"?>
-<p:sld xmlns:a="http://schemas.openxmlformats.org/drawingml/2006/main" xmlns:r="http://schemas.openxmlformats.org/officeDocument/2006/relationships" xmlns:p="http://schemas.openxmlformats.org/presentationml/2006/main">
-  <p:cSld>
-    <p:bg>
-      <p:bgPr>
-        <a:solidFill>
-          <a:srgbClr val="F0F2EB"/>
-        </a:solidFill>
-        <a:effectLst/>
-      </p:bgPr>
-    </p:bg>
-    <p:spTree>
-      <p:nvGrpSpPr>
-        <p:cNvPr id="1" name=""/>
-        <p:cNvGrpSpPr/>
-        <p:nvPr/>
-      </p:nvGrpSpPr>
-      <p:grpSpPr>
-        <a:xfrm>
-          <a:off x="0" y="0"/>
-          <a:ext cx="0" cy="0"/>
-          <a:chOff x="0" y="0"/>
-          <a:chExt cx="0" cy="0"/>
-        </a:xfrm>
-      </p:grpSpPr>
-      <p:pic>
-        <p:nvPicPr>
-          <p:cNvPr id="3074" name="Picture 2"/>
+          <p:cNvPr id="5" name="Picture 2"/>
           <p:cNvPicPr>
             <a:picLocks noChangeAspect="1" noChangeArrowheads="1"/>
           </p:cNvPicPr>
           <p:nvPr/>
         </p:nvPicPr>
         <p:blipFill rotWithShape="1">
-          <a:blip r:embed="rId2">
+          <a:blip r:embed="rId3">
             <a:extLst>
               <a:ext uri="{28A0092B-C50C-407E-A947-70E740481C1C}">
                 <a14:useLocalDpi xmlns:a14="http://schemas.microsoft.com/office/drawing/2010/main" val="0"/>
@@ -6944,7 +7620,7 @@
         </p:blipFill>
         <p:spPr bwMode="auto">
           <a:xfrm>
-            <a:off x="145357" y="311468"/>
+            <a:off x="145357" y="1143000"/>
             <a:ext cx="8846243" cy="5251132"/>
           </a:xfrm>
           <a:prstGeom prst="rect">
@@ -6987,13 +7663,13 @@
       </p:pic>
       <p:sp>
         <p:nvSpPr>
-          <p:cNvPr id="9" name="Rectangle 8"/>
+          <p:cNvPr id="6" name="Rectangle 5"/>
           <p:cNvSpPr/>
           <p:nvPr/>
         </p:nvSpPr>
         <p:spPr>
           <a:xfrm>
-            <a:off x="5845965" y="6019800"/>
+            <a:off x="5845965" y="6380946"/>
             <a:ext cx="3281668" cy="477054"/>
           </a:xfrm>
           <a:prstGeom prst="rect">
@@ -7009,7 +7685,7 @@
             <a:r>
               <a:rPr lang="en-US" sz="2500" dirty="0">
                 <a:latin typeface="Yanone Kaffeesatz Bold" pitchFamily="2" charset="0"/>
-                <a:hlinkClick r:id="rId3"/>
+                <a:hlinkClick r:id="rId4"/>
               </a:rPr>
               <a:t>http://caniuse.com/websockets</a:t>
             </a:r>
@@ -7026,13 +7702,13 @@
       </p:sp>
       <p:sp>
         <p:nvSpPr>
-          <p:cNvPr id="15" name="Rectangle 14"/>
+          <p:cNvPr id="3" name="Rectangle 2"/>
           <p:cNvSpPr/>
           <p:nvPr/>
         </p:nvSpPr>
         <p:spPr>
           <a:xfrm>
-            <a:off x="2133599" y="5486400"/>
+            <a:off x="5181600" y="-76200"/>
             <a:ext cx="1157689" cy="1477328"/>
           </a:xfrm>
           <a:prstGeom prst="rect">
@@ -7065,7 +7741,7 @@
     </p:spTree>
     <p:extLst>
       <p:ext uri="{BB962C8B-B14F-4D97-AF65-F5344CB8AC3E}">
-        <p14:creationId xmlns:p14="http://schemas.microsoft.com/office/powerpoint/2010/main" val="2453695261"/>
+        <p14:creationId xmlns:p14="http://schemas.microsoft.com/office/powerpoint/2010/main" val="3128495125"/>
       </p:ext>
     </p:extLst>
   </p:cSld>
@@ -7106,7 +7782,7 @@
                                           </p:stCondLst>
                                         </p:cTn>
                                         <p:tgtEl>
-                                          <p:spTgt spid="15"/>
+                                          <p:spTgt spid="3"/>
                                         </p:tgtEl>
                                         <p:attrNameLst>
                                           <p:attrName>style.visibility</p:attrName>
@@ -7147,7 +7823,7 @@
       </p:par>
     </p:tnLst>
     <p:bldLst>
-      <p:bldP spid="15" grpId="0"/>
+      <p:bldP spid="3" grpId="0"/>
     </p:bldLst>
   </p:timing>
 </p:sld>
@@ -9094,20 +9770,7 @@
                 <a:latin typeface="Yanone Kaffeesatz Bold" pitchFamily="2" charset="0"/>
                 <a:cs typeface="Aharoni" pitchFamily="2" charset="-79"/>
               </a:rPr>
-              <a:t>One </a:t>
-            </a:r>
-            <a:r>
-              <a:rPr lang="en-US" sz="8000" dirty="0" smtClean="0">
-                <a:solidFill>
-                  <a:schemeClr val="tx2">
-                    <a:lumMod val="60000"/>
-                    <a:lumOff val="40000"/>
-                  </a:schemeClr>
-                </a:solidFill>
-                <a:latin typeface="Yanone Kaffeesatz Bold" pitchFamily="2" charset="0"/>
-                <a:cs typeface="Aharoni" pitchFamily="2" charset="-79"/>
-              </a:rPr>
-              <a:t>ASP.NET</a:t>
+              <a:t>One ASP.NET</a:t>
             </a:r>
             <a:endParaRPr lang="en-US" sz="8000" dirty="0">
               <a:solidFill>
@@ -12636,19 +13299,7 @@
                 <a:latin typeface="Yanone Kaffeesatz Bold" pitchFamily="2" charset="0"/>
                 <a:cs typeface="Aharoni" pitchFamily="2" charset="-79"/>
               </a:rPr>
-              <a:t>Demo – </a:t>
-            </a:r>
-            <a:r>
-              <a:rPr lang="en-US" sz="9000" dirty="0" smtClean="0">
-                <a:solidFill>
-                  <a:schemeClr val="accent2">
-                    <a:lumMod val="75000"/>
-                  </a:schemeClr>
-                </a:solidFill>
-                <a:latin typeface="Yanone Kaffeesatz Bold" pitchFamily="2" charset="0"/>
-                <a:cs typeface="Aharoni" pitchFamily="2" charset="-79"/>
-              </a:rPr>
-              <a:t>Polling stock ticker</a:t>
+              <a:t>Demo – Polling stock ticker</a:t>
             </a:r>
             <a:r>
               <a:rPr lang="en-US" sz="15000" dirty="0" smtClean="0">
@@ -12825,8 +13476,8 @@
               <a:rPr lang="en-US" sz="4000" dirty="0" smtClean="0">
                 <a:solidFill>
                   <a:schemeClr val="tx1">
-                    <a:lumMod val="50000"/>
-                    <a:lumOff val="50000"/>
+                    <a:lumMod val="65000"/>
+                    <a:lumOff val="35000"/>
                   </a:schemeClr>
                 </a:solidFill>
                 <a:latin typeface="Yanone Kaffeesatz Bold" pitchFamily="2" charset="0"/>
@@ -12837,8 +13488,8 @@
               <a:rPr lang="en-US" sz="4000" dirty="0">
                 <a:solidFill>
                   <a:schemeClr val="tx1">
-                    <a:lumMod val="50000"/>
-                    <a:lumOff val="50000"/>
+                    <a:lumMod val="65000"/>
+                    <a:lumOff val="35000"/>
                   </a:schemeClr>
                 </a:solidFill>
                 <a:latin typeface="Yanone Kaffeesatz Bold" pitchFamily="2" charset="0"/>
@@ -12849,8 +13500,8 @@
               <a:rPr lang="en-US" sz="4000" dirty="0" smtClean="0">
                 <a:solidFill>
                   <a:schemeClr val="tx1">
-                    <a:lumMod val="50000"/>
-                    <a:lumOff val="50000"/>
+                    <a:lumMod val="65000"/>
+                    <a:lumOff val="35000"/>
                   </a:schemeClr>
                 </a:solidFill>
                 <a:latin typeface="Yanone Kaffeesatz Bold" pitchFamily="2" charset="0"/>
@@ -12860,8 +13511,8 @@
             <a:endParaRPr lang="en-US" sz="4000" dirty="0">
               <a:solidFill>
                 <a:schemeClr val="tx1">
-                  <a:lumMod val="50000"/>
-                  <a:lumOff val="50000"/>
+                  <a:lumMod val="65000"/>
+                  <a:lumOff val="35000"/>
                 </a:schemeClr>
               </a:solidFill>
               <a:latin typeface="Yanone Kaffeesatz Bold" pitchFamily="2" charset="0"/>
@@ -12876,8 +13527,8 @@
               <a:rPr lang="en-US" sz="3000" dirty="0" err="1" smtClean="0">
                 <a:solidFill>
                   <a:schemeClr val="tx1">
-                    <a:lumMod val="50000"/>
-                    <a:lumOff val="50000"/>
+                    <a:lumMod val="65000"/>
+                    <a:lumOff val="35000"/>
                   </a:schemeClr>
                 </a:solidFill>
                 <a:latin typeface="Yanone Kaffeesatz Bold" pitchFamily="2" charset="0"/>
@@ -12888,8 +13539,8 @@
               <a:rPr lang="en-US" sz="3000" dirty="0" smtClean="0">
                 <a:solidFill>
                   <a:schemeClr val="tx1">
-                    <a:lumMod val="50000"/>
-                    <a:lumOff val="50000"/>
+                    <a:lumMod val="65000"/>
+                    <a:lumOff val="35000"/>
                   </a:schemeClr>
                 </a:solidFill>
                 <a:latin typeface="Yanone Kaffeesatz Bold" pitchFamily="2" charset="0"/>
@@ -12900,8 +13551,8 @@
               <a:rPr lang="en-US" sz="3000" dirty="0" err="1" smtClean="0">
                 <a:solidFill>
                   <a:schemeClr val="tx1">
-                    <a:lumMod val="50000"/>
-                    <a:lumOff val="50000"/>
+                    <a:lumMod val="65000"/>
+                    <a:lumOff val="35000"/>
                   </a:schemeClr>
                 </a:solidFill>
                 <a:latin typeface="Yanone Kaffeesatz Bold" pitchFamily="2" charset="0"/>
@@ -12911,8 +13562,8 @@
             <a:endParaRPr lang="en-US" sz="3000" dirty="0">
               <a:solidFill>
                 <a:schemeClr val="tx1">
-                  <a:lumMod val="50000"/>
-                  <a:lumOff val="50000"/>
+                  <a:lumMod val="65000"/>
+                  <a:lumOff val="35000"/>
                 </a:schemeClr>
               </a:solidFill>
               <a:latin typeface="Yanone Kaffeesatz Bold" pitchFamily="2" charset="0"/>
@@ -12947,8 +13598,8 @@
               <a:rPr lang="en-US" sz="4000" dirty="0" smtClean="0">
                 <a:solidFill>
                   <a:schemeClr val="tx1">
-                    <a:lumMod val="50000"/>
-                    <a:lumOff val="50000"/>
+                    <a:lumMod val="65000"/>
+                    <a:lumOff val="35000"/>
                   </a:schemeClr>
                 </a:solidFill>
                 <a:latin typeface="Yanone Kaffeesatz Bold" pitchFamily="2" charset="0"/>
@@ -13007,19 +13658,43 @@
               <a:rPr lang="en-US" sz="4000" dirty="0" smtClean="0">
                 <a:solidFill>
                   <a:schemeClr val="tx1">
+                    <a:lumMod val="65000"/>
+                    <a:lumOff val="35000"/>
+                  </a:schemeClr>
+                </a:solidFill>
+                <a:latin typeface="Yanone Kaffeesatz Bold" pitchFamily="2" charset="0"/>
+              </a:rPr>
+              <a:t>Update</a:t>
+            </a:r>
+            <a:r>
+              <a:rPr lang="en-US" sz="4000" dirty="0" smtClean="0">
+                <a:solidFill>
+                  <a:schemeClr val="tx1">
                     <a:lumMod val="50000"/>
                     <a:lumOff val="50000"/>
                   </a:schemeClr>
                 </a:solidFill>
                 <a:latin typeface="Yanone Kaffeesatz Bold" pitchFamily="2" charset="0"/>
               </a:rPr>
-              <a:t>Update Panels</a:t>
+              <a:t> </a:t>
+            </a:r>
+            <a:r>
+              <a:rPr lang="en-US" sz="4000" dirty="0" smtClean="0">
+                <a:solidFill>
+                  <a:schemeClr val="tx1">
+                    <a:lumMod val="65000"/>
+                    <a:lumOff val="35000"/>
+                  </a:schemeClr>
+                </a:solidFill>
+                <a:latin typeface="Yanone Kaffeesatz Bold" pitchFamily="2" charset="0"/>
+              </a:rPr>
+              <a:t>Panels</a:t>
             </a:r>
             <a:endParaRPr lang="en-US" sz="4000" dirty="0">
               <a:solidFill>
                 <a:schemeClr val="tx1">
-                  <a:lumMod val="50000"/>
-                  <a:lumOff val="50000"/>
+                  <a:lumMod val="65000"/>
+                  <a:lumOff val="35000"/>
                 </a:schemeClr>
               </a:solidFill>
               <a:latin typeface="Yanone Kaffeesatz Bold" pitchFamily="2" charset="0"/>
@@ -13134,8 +13809,8 @@
               <a:rPr lang="en-US" sz="3000" dirty="0" smtClean="0">
                 <a:solidFill>
                   <a:schemeClr val="tx1">
-                    <a:lumMod val="50000"/>
-                    <a:lumOff val="50000"/>
+                    <a:lumMod val="65000"/>
+                    <a:lumOff val="35000"/>
                   </a:schemeClr>
                 </a:solidFill>
                 <a:latin typeface="Yanone Kaffeesatz Bold" pitchFamily="2" charset="0"/>
@@ -13144,9 +13819,9 @@
             </a:r>
             <a:endParaRPr lang="en-US" sz="3000" dirty="0">
               <a:solidFill>
-                <a:schemeClr val="tx2">
-                  <a:lumMod val="60000"/>
-                  <a:lumOff val="40000"/>
+                <a:schemeClr val="tx1">
+                  <a:lumMod val="65000"/>
+                  <a:lumOff val="35000"/>
                 </a:schemeClr>
               </a:solidFill>
               <a:latin typeface="Yanone Kaffeesatz Bold" pitchFamily="2" charset="0"/>
@@ -13215,13 +13890,37 @@
               <a:rPr lang="en-US" sz="3000" dirty="0">
                 <a:solidFill>
                   <a:schemeClr val="tx1">
+                    <a:lumMod val="65000"/>
+                    <a:lumOff val="35000"/>
+                  </a:schemeClr>
+                </a:solidFill>
+                <a:latin typeface="Yanone Kaffeesatz Bold" pitchFamily="2" charset="0"/>
+              </a:rPr>
+              <a:t>Server</a:t>
+            </a:r>
+            <a:r>
+              <a:rPr lang="en-US" sz="3000" dirty="0">
+                <a:solidFill>
+                  <a:schemeClr val="tx1">
                     <a:lumMod val="50000"/>
                     <a:lumOff val="50000"/>
                   </a:schemeClr>
                 </a:solidFill>
                 <a:latin typeface="Yanone Kaffeesatz Bold" pitchFamily="2" charset="0"/>
               </a:rPr>
-              <a:t>Server Load</a:t>
+              <a:t> </a:t>
+            </a:r>
+            <a:r>
+              <a:rPr lang="en-US" sz="3000" dirty="0">
+                <a:solidFill>
+                  <a:schemeClr val="tx1">
+                    <a:lumMod val="65000"/>
+                    <a:lumOff val="35000"/>
+                  </a:schemeClr>
+                </a:solidFill>
+                <a:latin typeface="Yanone Kaffeesatz Bold" pitchFamily="2" charset="0"/>
+              </a:rPr>
+              <a:t>Load</a:t>
             </a:r>
           </a:p>
         </p:txBody>
@@ -13284,13 +13983,37 @@
               <a:rPr lang="en-US" sz="3000" dirty="0">
                 <a:solidFill>
                   <a:schemeClr val="tx1">
+                    <a:lumMod val="65000"/>
+                    <a:lumOff val="35000"/>
+                  </a:schemeClr>
+                </a:solidFill>
+                <a:latin typeface="Yanone Kaffeesatz Bold" pitchFamily="2" charset="0"/>
+              </a:rPr>
+              <a:t>Server</a:t>
+            </a:r>
+            <a:r>
+              <a:rPr lang="en-US" sz="3000" dirty="0">
+                <a:solidFill>
+                  <a:schemeClr val="tx1">
                     <a:lumMod val="50000"/>
                     <a:lumOff val="50000"/>
                   </a:schemeClr>
                 </a:solidFill>
                 <a:latin typeface="Yanone Kaffeesatz Bold" pitchFamily="2" charset="0"/>
               </a:rPr>
-              <a:t>Server Load</a:t>
+              <a:t> </a:t>
+            </a:r>
+            <a:r>
+              <a:rPr lang="en-US" sz="3000" dirty="0">
+                <a:solidFill>
+                  <a:schemeClr val="tx1">
+                    <a:lumMod val="65000"/>
+                    <a:lumOff val="35000"/>
+                  </a:schemeClr>
+                </a:solidFill>
+                <a:latin typeface="Yanone Kaffeesatz Bold" pitchFamily="2" charset="0"/>
+              </a:rPr>
+              <a:t>Load</a:t>
             </a:r>
           </a:p>
         </p:txBody>
@@ -13355,8 +14078,8 @@
               <a:rPr lang="en-US" sz="3000" dirty="0">
                 <a:solidFill>
                   <a:schemeClr val="tx1">
-                    <a:lumMod val="50000"/>
-                    <a:lumOff val="50000"/>
+                    <a:lumMod val="65000"/>
+                    <a:lumOff val="35000"/>
                   </a:schemeClr>
                 </a:solidFill>
                 <a:latin typeface="Yanone Kaffeesatz Bold" pitchFamily="2" charset="0"/>
@@ -13365,9 +14088,9 @@
             </a:r>
             <a:endParaRPr lang="en-US" sz="3000" dirty="0">
               <a:solidFill>
-                <a:schemeClr val="tx2">
-                  <a:lumMod val="60000"/>
-                  <a:lumOff val="40000"/>
+                <a:schemeClr val="tx1">
+                  <a:lumMod val="65000"/>
+                  <a:lumOff val="35000"/>
                 </a:schemeClr>
               </a:solidFill>
               <a:latin typeface="Yanone Kaffeesatz Bold" pitchFamily="2" charset="0"/>
@@ -13420,42 +14143,7 @@
                                           </p:stCondLst>
                                         </p:cTn>
                                         <p:tgtEl>
-                                          <p:spTgt spid="4">
-                                            <p:txEl>
-                                              <p:pRg st="0" end="0"/>
-                                            </p:txEl>
-                                          </p:spTgt>
-                                        </p:tgtEl>
-                                        <p:attrNameLst>
-                                          <p:attrName>style.visibility</p:attrName>
-                                        </p:attrNameLst>
-                                      </p:cBhvr>
-                                      <p:to>
-                                        <p:strVal val="visible"/>
-                                      </p:to>
-                                    </p:set>
-                                  </p:childTnLst>
-                                </p:cTn>
-                              </p:par>
-                              <p:par>
-                                <p:cTn id="7" presetID="1" presetClass="entr" presetSubtype="0" fill="hold" nodeType="withEffect">
-                                  <p:stCondLst>
-                                    <p:cond delay="0"/>
-                                  </p:stCondLst>
-                                  <p:childTnLst>
-                                    <p:set>
-                                      <p:cBhvr>
-                                        <p:cTn id="8" dur="1" fill="hold">
-                                          <p:stCondLst>
-                                            <p:cond delay="0"/>
-                                          </p:stCondLst>
-                                        </p:cTn>
-                                        <p:tgtEl>
-                                          <p:spTgt spid="4">
-                                            <p:txEl>
-                                              <p:pRg st="1" end="1"/>
-                                            </p:txEl>
-                                          </p:spTgt>
+                                          <p:spTgt spid="2050"/>
                                         </p:tgtEl>
                                         <p:attrNameLst>
                                           <p:attrName>style.visibility</p:attrName>
@@ -13475,19 +14163,50 @@
                     </p:cTn>
                   </p:par>
                   <p:par>
-                    <p:cTn id="9" fill="hold">
+                    <p:cTn id="7" fill="hold">
                       <p:stCondLst>
                         <p:cond delay="indefinite"/>
                       </p:stCondLst>
                       <p:childTnLst>
                         <p:par>
-                          <p:cTn id="10" fill="hold">
+                          <p:cTn id="8" fill="hold">
                             <p:stCondLst>
                               <p:cond delay="0"/>
                             </p:stCondLst>
                             <p:childTnLst>
                               <p:par>
-                                <p:cTn id="11" presetID="1" presetClass="entr" presetSubtype="0" fill="hold" nodeType="clickEffect">
+                                <p:cTn id="9" presetID="1" presetClass="entr" presetSubtype="0" fill="hold" nodeType="clickEffect">
+                                  <p:stCondLst>
+                                    <p:cond delay="0"/>
+                                  </p:stCondLst>
+                                  <p:childTnLst>
+                                    <p:set>
+                                      <p:cBhvr>
+                                        <p:cTn id="10" dur="1" fill="hold">
+                                          <p:stCondLst>
+                                            <p:cond delay="0"/>
+                                          </p:stCondLst>
+                                        </p:cTn>
+                                        <p:tgtEl>
+                                          <p:spTgt spid="4">
+                                            <p:txEl>
+                                              <p:pRg st="0" end="0"/>
+                                            </p:txEl>
+                                          </p:spTgt>
+                                        </p:tgtEl>
+                                        <p:attrNameLst>
+                                          <p:attrName>style.visibility</p:attrName>
+                                        </p:attrNameLst>
+                                      </p:cBhvr>
+                                      <p:to>
+                                        <p:strVal val="visible"/>
+                                      </p:to>
+                                    </p:set>
+                                  </p:childTnLst>
+                                </p:cTn>
+                              </p:par>
+                              <p:par>
+                                <p:cTn id="11" presetID="1" presetClass="entr" presetSubtype="0" fill="hold" nodeType="withEffect">
                                   <p:stCondLst>
                                     <p:cond delay="0"/>
                                   </p:stCondLst>
@@ -13502,7 +14221,7 @@
                                         <p:tgtEl>
                                           <p:spTgt spid="4">
                                             <p:txEl>
-                                              <p:pRg st="4" end="4"/>
+                                              <p:pRg st="1" end="1"/>
                                             </p:txEl>
                                           </p:spTgt>
                                         </p:tgtEl>
@@ -13536,7 +14255,7 @@
                             </p:stCondLst>
                             <p:childTnLst>
                               <p:par>
-                                <p:cTn id="15" presetID="1" presetClass="entr" presetSubtype="0" fill="hold" grpId="0" nodeType="clickEffect">
+                                <p:cTn id="15" presetID="1" presetClass="entr" presetSubtype="0" fill="hold" nodeType="clickEffect">
                                   <p:stCondLst>
                                     <p:cond delay="0"/>
                                   </p:stCondLst>
@@ -13549,7 +14268,11 @@
                                           </p:stCondLst>
                                         </p:cTn>
                                         <p:tgtEl>
-                                          <p:spTgt spid="7"/>
+                                          <p:spTgt spid="4">
+                                            <p:txEl>
+                                              <p:pRg st="4" end="4"/>
+                                            </p:txEl>
+                                          </p:spTgt>
                                         </p:tgtEl>
                                         <p:attrNameLst>
                                           <p:attrName>style.visibility</p:attrName>
@@ -13594,7 +14317,7 @@
                                           </p:stCondLst>
                                         </p:cTn>
                                         <p:tgtEl>
-                                          <p:spTgt spid="8"/>
+                                          <p:spTgt spid="7"/>
                                         </p:tgtEl>
                                         <p:attrNameLst>
                                           <p:attrName>style.visibility</p:attrName>
@@ -13639,7 +14362,7 @@
                                           </p:stCondLst>
                                         </p:cTn>
                                         <p:tgtEl>
-                                          <p:spTgt spid="9"/>
+                                          <p:spTgt spid="8"/>
                                         </p:tgtEl>
                                         <p:attrNameLst>
                                           <p:attrName>style.visibility</p:attrName>
@@ -13684,7 +14407,146 @@
                                           </p:stCondLst>
                                         </p:cTn>
                                         <p:tgtEl>
+                                          <p:spTgt spid="9"/>
+                                        </p:tgtEl>
+                                        <p:attrNameLst>
+                                          <p:attrName>style.visibility</p:attrName>
+                                        </p:attrNameLst>
+                                      </p:cBhvr>
+                                      <p:to>
+                                        <p:strVal val="visible"/>
+                                      </p:to>
+                                    </p:set>
+                                  </p:childTnLst>
+                                </p:cTn>
+                              </p:par>
+                            </p:childTnLst>
+                          </p:cTn>
+                        </p:par>
+                      </p:childTnLst>
+                    </p:cTn>
+                  </p:par>
+                  <p:par>
+                    <p:cTn id="29" fill="hold">
+                      <p:stCondLst>
+                        <p:cond delay="indefinite"/>
+                      </p:stCondLst>
+                      <p:childTnLst>
+                        <p:par>
+                          <p:cTn id="30" fill="hold">
+                            <p:stCondLst>
+                              <p:cond delay="0"/>
+                            </p:stCondLst>
+                            <p:childTnLst>
+                              <p:par>
+                                <p:cTn id="31" presetID="1" presetClass="entr" presetSubtype="0" fill="hold" grpId="0" nodeType="clickEffect">
+                                  <p:stCondLst>
+                                    <p:cond delay="0"/>
+                                  </p:stCondLst>
+                                  <p:childTnLst>
+                                    <p:set>
+                                      <p:cBhvr>
+                                        <p:cTn id="32" dur="1" fill="hold">
+                                          <p:stCondLst>
+                                            <p:cond delay="0"/>
+                                          </p:stCondLst>
+                                        </p:cTn>
+                                        <p:tgtEl>
                                           <p:spTgt spid="10"/>
+                                        </p:tgtEl>
+                                        <p:attrNameLst>
+                                          <p:attrName>style.visibility</p:attrName>
+                                        </p:attrNameLst>
+                                      </p:cBhvr>
+                                      <p:to>
+                                        <p:strVal val="visible"/>
+                                      </p:to>
+                                    </p:set>
+                                  </p:childTnLst>
+                                </p:cTn>
+                              </p:par>
+                            </p:childTnLst>
+                          </p:cTn>
+                        </p:par>
+                      </p:childTnLst>
+                    </p:cTn>
+                  </p:par>
+                  <p:par>
+                    <p:cTn id="33" fill="hold">
+                      <p:stCondLst>
+                        <p:cond delay="indefinite"/>
+                      </p:stCondLst>
+                      <p:childTnLst>
+                        <p:par>
+                          <p:cTn id="34" fill="hold">
+                            <p:stCondLst>
+                              <p:cond delay="0"/>
+                            </p:stCondLst>
+                            <p:childTnLst>
+                              <p:par>
+                                <p:cTn id="35" presetID="1" presetClass="entr" presetSubtype="0" fill="hold" nodeType="clickEffect">
+                                  <p:stCondLst>
+                                    <p:cond delay="0"/>
+                                  </p:stCondLst>
+                                  <p:childTnLst>
+                                    <p:set>
+                                      <p:cBhvr>
+                                        <p:cTn id="36" dur="1" fill="hold">
+                                          <p:stCondLst>
+                                            <p:cond delay="0"/>
+                                          </p:stCondLst>
+                                        </p:cTn>
+                                        <p:tgtEl>
+                                          <p:spTgt spid="4">
+                                            <p:txEl>
+                                              <p:pRg st="9" end="9"/>
+                                            </p:txEl>
+                                          </p:spTgt>
+                                        </p:tgtEl>
+                                        <p:attrNameLst>
+                                          <p:attrName>style.visibility</p:attrName>
+                                        </p:attrNameLst>
+                                      </p:cBhvr>
+                                      <p:to>
+                                        <p:strVal val="visible"/>
+                                      </p:to>
+                                    </p:set>
+                                  </p:childTnLst>
+                                </p:cTn>
+                              </p:par>
+                            </p:childTnLst>
+                          </p:cTn>
+                        </p:par>
+                      </p:childTnLst>
+                    </p:cTn>
+                  </p:par>
+                  <p:par>
+                    <p:cTn id="37" fill="hold">
+                      <p:stCondLst>
+                        <p:cond delay="indefinite"/>
+                      </p:stCondLst>
+                      <p:childTnLst>
+                        <p:par>
+                          <p:cTn id="38" fill="hold">
+                            <p:stCondLst>
+                              <p:cond delay="0"/>
+                            </p:stCondLst>
+                            <p:childTnLst>
+                              <p:par>
+                                <p:cTn id="39" presetID="1" presetClass="entr" presetSubtype="0" fill="hold" nodeType="clickEffect">
+                                  <p:stCondLst>
+                                    <p:cond delay="0"/>
+                                  </p:stCondLst>
+                                  <p:childTnLst>
+                                    <p:set>
+                                      <p:cBhvr>
+                                        <p:cTn id="40" dur="1" fill="hold">
+                                          <p:stCondLst>
+                                            <p:cond delay="0"/>
+                                          </p:stCondLst>
+                                        </p:cTn>
+                                        <p:tgtEl>
+                                          <p:spTgt spid="1027"/>
                                         </p:tgtEl>
                                         <p:attrNameLst>
                                           <p:attrName>style.visibility</p:attrName>
@@ -13777,7 +14639,7 @@
           <a:lstStyle/>
           <a:p>
             <a:r>
-              <a:rPr lang="en-US" sz="9000" dirty="0" smtClean="0">
+              <a:rPr lang="en-US" sz="12000" dirty="0" smtClean="0">
                 <a:solidFill>
                   <a:schemeClr val="accent2">
                     <a:lumMod val="75000"/>
@@ -13786,9 +14648,9 @@
                 <a:latin typeface="Yanone Kaffeesatz Bold" pitchFamily="2" charset="0"/>
                 <a:cs typeface="Aharoni" pitchFamily="2" charset="-79"/>
               </a:rPr>
-              <a:t>MOAR REALTIME!</a:t>
-            </a:r>
-            <a:endParaRPr lang="en-US" sz="15000" dirty="0">
+              <a:t>BETTER!</a:t>
+            </a:r>
+            <a:endParaRPr lang="en-US" sz="12000" dirty="0">
               <a:solidFill>
                 <a:srgbClr val="F0F2EB"/>
               </a:solidFill>

</xml_diff>